<commit_message>
Update eval and comparison system figure
</commit_message>
<xml_diff>
--- a/yfcc100m/paper/vldb2020/figures/comparison_system.pptx
+++ b/yfcc100m/paper/vldb2020/figures/comparison_system.pptx
@@ -2,12 +2,12 @@
 <file path=ppt/presentation.xml><?xml version="1.0" encoding="utf-8"?>
 <p:presentation xmlns:a="http://schemas.openxmlformats.org/drawingml/2006/main" xmlns:r="http://schemas.openxmlformats.org/officeDocument/2006/relationships" xmlns:p="http://schemas.openxmlformats.org/presentationml/2006/main" saveSubsetFonts="1" autoCompressPictures="0">
   <p:sldMasterIdLst>
-    <p:sldMasterId id="2147483674" r:id="rId1"/>
+    <p:sldMasterId id="2147483700" r:id="rId1"/>
   </p:sldMasterIdLst>
   <p:sldIdLst>
     <p:sldId id="1464" r:id="rId2"/>
   </p:sldIdLst>
-  <p:sldSz cx="9174163" cy="5119688"/>
+  <p:sldSz cx="7772400" cy="3657600"/>
   <p:notesSz cx="6858000" cy="9144000"/>
   <p:defaultTextStyle>
     <a:defPPr>
@@ -104,6 +104,11 @@
       </a:defRPr>
     </a:lvl9pPr>
   </p:defaultTextStyle>
+  <p:extLst>
+    <p:ext uri="{EFAFB233-063F-42B5-8137-9DF3F51BA10A}">
+      <p15:sldGuideLst xmlns:p15="http://schemas.microsoft.com/office/powerpoint/2012/main"/>
+    </p:ext>
+  </p:extLst>
 </p:presentation>
 </file>
 
@@ -136,15 +141,15 @@
         </p:nvSpPr>
         <p:spPr>
           <a:xfrm>
-            <a:off x="1146771" y="837875"/>
-            <a:ext cx="6880622" cy="1782410"/>
+            <a:off x="971550" y="598593"/>
+            <a:ext cx="5829300" cy="1273387"/>
           </a:xfrm>
         </p:spPr>
         <p:txBody>
           <a:bodyPr anchor="b"/>
           <a:lstStyle>
             <a:lvl1pPr algn="ctr">
-              <a:defRPr sz="4479"/>
+              <a:defRPr sz="3200"/>
             </a:lvl1pPr>
           </a:lstStyle>
           <a:p>
@@ -168,8 +173,8 @@
         </p:nvSpPr>
         <p:spPr>
           <a:xfrm>
-            <a:off x="1146771" y="2689022"/>
-            <a:ext cx="6880622" cy="1236072"/>
+            <a:off x="971550" y="1921087"/>
+            <a:ext cx="5829300" cy="883073"/>
           </a:xfrm>
         </p:spPr>
         <p:txBody>
@@ -177,39 +182,39 @@
           <a:lstStyle>
             <a:lvl1pPr marL="0" indent="0" algn="ctr">
               <a:buNone/>
-              <a:defRPr sz="1792"/>
+              <a:defRPr sz="1280"/>
             </a:lvl1pPr>
-            <a:lvl2pPr marL="341300" indent="0" algn="ctr">
-              <a:buNone/>
-              <a:defRPr sz="1493"/>
+            <a:lvl2pPr marL="243825" indent="0" algn="ctr">
+              <a:buNone/>
+              <a:defRPr sz="1067"/>
             </a:lvl2pPr>
-            <a:lvl3pPr marL="682600" indent="0" algn="ctr">
-              <a:buNone/>
-              <a:defRPr sz="1344"/>
+            <a:lvl3pPr marL="487650" indent="0" algn="ctr">
+              <a:buNone/>
+              <a:defRPr sz="960"/>
             </a:lvl3pPr>
-            <a:lvl4pPr marL="1023899" indent="0" algn="ctr">
-              <a:buNone/>
-              <a:defRPr sz="1194"/>
+            <a:lvl4pPr marL="731474" indent="0" algn="ctr">
+              <a:buNone/>
+              <a:defRPr sz="853"/>
             </a:lvl4pPr>
-            <a:lvl5pPr marL="1365199" indent="0" algn="ctr">
-              <a:buNone/>
-              <a:defRPr sz="1194"/>
+            <a:lvl5pPr marL="975299" indent="0" algn="ctr">
+              <a:buNone/>
+              <a:defRPr sz="853"/>
             </a:lvl5pPr>
-            <a:lvl6pPr marL="1706499" indent="0" algn="ctr">
-              <a:buNone/>
-              <a:defRPr sz="1194"/>
+            <a:lvl6pPr marL="1219124" indent="0" algn="ctr">
+              <a:buNone/>
+              <a:defRPr sz="853"/>
             </a:lvl6pPr>
-            <a:lvl7pPr marL="2047799" indent="0" algn="ctr">
-              <a:buNone/>
-              <a:defRPr sz="1194"/>
+            <a:lvl7pPr marL="1462949" indent="0" algn="ctr">
+              <a:buNone/>
+              <a:defRPr sz="853"/>
             </a:lvl7pPr>
-            <a:lvl8pPr marL="2389099" indent="0" algn="ctr">
-              <a:buNone/>
-              <a:defRPr sz="1194"/>
+            <a:lvl8pPr marL="1706773" indent="0" algn="ctr">
+              <a:buNone/>
+              <a:defRPr sz="853"/>
             </a:lvl8pPr>
-            <a:lvl9pPr marL="2730398" indent="0" algn="ctr">
-              <a:buNone/>
-              <a:defRPr sz="1194"/>
+            <a:lvl9pPr marL="1950598" indent="0" algn="ctr">
+              <a:buNone/>
+              <a:defRPr sz="853"/>
             </a:lvl9pPr>
           </a:lstStyle>
           <a:p>
@@ -238,7 +243,7 @@
           <a:p>
             <a:fld id="{FC088DA2-E2B4-0147-A2CD-628931F110B8}" type="datetimeFigureOut">
               <a:rPr lang="en-US" smtClean="0"/>
-              <a:t>1/14/20</a:t>
+              <a:t>1/31/20</a:t>
             </a:fld>
             <a:endParaRPr lang="en-US"/>
           </a:p>
@@ -289,7 +294,7 @@
     </p:spTree>
     <p:extLst>
       <p:ext uri="{BB962C8B-B14F-4D97-AF65-F5344CB8AC3E}">
-        <p14:creationId xmlns:p14="http://schemas.microsoft.com/office/powerpoint/2010/main" val="3862144165"/>
+        <p14:creationId xmlns:p14="http://schemas.microsoft.com/office/powerpoint/2010/main" val="1500193673"/>
       </p:ext>
     </p:extLst>
   </p:cSld>
@@ -408,7 +413,7 @@
           <a:p>
             <a:fld id="{FC088DA2-E2B4-0147-A2CD-628931F110B8}" type="datetimeFigureOut">
               <a:rPr lang="en-US" smtClean="0"/>
-              <a:t>1/14/20</a:t>
+              <a:t>1/31/20</a:t>
             </a:fld>
             <a:endParaRPr lang="en-US"/>
           </a:p>
@@ -459,7 +464,7 @@
     </p:spTree>
     <p:extLst>
       <p:ext uri="{BB962C8B-B14F-4D97-AF65-F5344CB8AC3E}">
-        <p14:creationId xmlns:p14="http://schemas.microsoft.com/office/powerpoint/2010/main" val="1863132838"/>
+        <p14:creationId xmlns:p14="http://schemas.microsoft.com/office/powerpoint/2010/main" val="162623568"/>
       </p:ext>
     </p:extLst>
   </p:cSld>
@@ -498,8 +503,8 @@
         </p:nvSpPr>
         <p:spPr>
           <a:xfrm>
-            <a:off x="6565260" y="272576"/>
-            <a:ext cx="1978179" cy="4338699"/>
+            <a:off x="5562124" y="194733"/>
+            <a:ext cx="1675924" cy="3099647"/>
           </a:xfrm>
         </p:spPr>
         <p:txBody>
@@ -526,8 +531,8 @@
         </p:nvSpPr>
         <p:spPr>
           <a:xfrm>
-            <a:off x="630724" y="272576"/>
-            <a:ext cx="5819860" cy="4338699"/>
+            <a:off x="534353" y="194733"/>
+            <a:ext cx="4930616" cy="3099647"/>
           </a:xfrm>
         </p:spPr>
         <p:txBody>
@@ -588,7 +593,7 @@
           <a:p>
             <a:fld id="{FC088DA2-E2B4-0147-A2CD-628931F110B8}" type="datetimeFigureOut">
               <a:rPr lang="en-US" smtClean="0"/>
-              <a:t>1/14/20</a:t>
+              <a:t>1/31/20</a:t>
             </a:fld>
             <a:endParaRPr lang="en-US"/>
           </a:p>
@@ -639,7 +644,7 @@
     </p:spTree>
     <p:extLst>
       <p:ext uri="{BB962C8B-B14F-4D97-AF65-F5344CB8AC3E}">
-        <p14:creationId xmlns:p14="http://schemas.microsoft.com/office/powerpoint/2010/main" val="2887649615"/>
+        <p14:creationId xmlns:p14="http://schemas.microsoft.com/office/powerpoint/2010/main" val="1363785917"/>
       </p:ext>
     </p:extLst>
   </p:cSld>
@@ -678,8 +683,8 @@
         </p:nvSpPr>
         <p:spPr>
           <a:xfrm>
-            <a:off x="457118" y="307421"/>
-            <a:ext cx="8256747" cy="864659"/>
+            <a:off x="387273" y="219629"/>
+            <a:ext cx="6995160" cy="617729"/>
           </a:xfrm>
           <a:prstGeom prst="rect">
             <a:avLst/>
@@ -707,8 +712,8 @@
         </p:nvSpPr>
         <p:spPr>
           <a:xfrm>
-            <a:off x="457116" y="1197756"/>
-            <a:ext cx="8255154" cy="3409965"/>
+            <a:off x="387273" y="855699"/>
+            <a:ext cx="6993810" cy="2436142"/>
           </a:xfrm>
           <a:prstGeom prst="rect">
             <a:avLst/>
@@ -766,8 +771,8 @@
         </p:nvSpPr>
         <p:spPr>
           <a:xfrm>
-            <a:off x="8767609" y="4624693"/>
-            <a:ext cx="368534" cy="273366"/>
+            <a:off x="7427965" y="3303966"/>
+            <a:ext cx="312224" cy="195298"/>
           </a:xfrm>
           <a:prstGeom prst="rect">
             <a:avLst/>
@@ -826,7 +831,7 @@
     </p:spTree>
     <p:extLst>
       <p:ext uri="{BB962C8B-B14F-4D97-AF65-F5344CB8AC3E}">
-        <p14:creationId xmlns:p14="http://schemas.microsoft.com/office/powerpoint/2010/main" val="1799993582"/>
+        <p14:creationId xmlns:p14="http://schemas.microsoft.com/office/powerpoint/2010/main" val="2919223023"/>
       </p:ext>
     </p:extLst>
   </p:cSld>
@@ -946,7 +951,7 @@
           <a:p>
             <a:fld id="{FC088DA2-E2B4-0147-A2CD-628931F110B8}" type="datetimeFigureOut">
               <a:rPr lang="en-US" smtClean="0"/>
-              <a:t>1/14/20</a:t>
+              <a:t>1/31/20</a:t>
             </a:fld>
             <a:endParaRPr lang="en-US"/>
           </a:p>
@@ -997,7 +1002,7 @@
     </p:spTree>
     <p:extLst>
       <p:ext uri="{BB962C8B-B14F-4D97-AF65-F5344CB8AC3E}">
-        <p14:creationId xmlns:p14="http://schemas.microsoft.com/office/powerpoint/2010/main" val="2604818132"/>
+        <p14:creationId xmlns:p14="http://schemas.microsoft.com/office/powerpoint/2010/main" val="39106682"/>
       </p:ext>
     </p:extLst>
   </p:cSld>
@@ -1036,15 +1041,15 @@
         </p:nvSpPr>
         <p:spPr>
           <a:xfrm>
-            <a:off x="625945" y="1276367"/>
-            <a:ext cx="7912716" cy="2129648"/>
+            <a:off x="530304" y="911860"/>
+            <a:ext cx="6703695" cy="1521460"/>
           </a:xfrm>
         </p:spPr>
         <p:txBody>
           <a:bodyPr anchor="b"/>
           <a:lstStyle>
             <a:lvl1pPr>
-              <a:defRPr sz="4479"/>
+              <a:defRPr sz="3200"/>
             </a:lvl1pPr>
           </a:lstStyle>
           <a:p>
@@ -1068,8 +1073,8 @@
         </p:nvSpPr>
         <p:spPr>
           <a:xfrm>
-            <a:off x="625945" y="3426163"/>
-            <a:ext cx="7912716" cy="1119931"/>
+            <a:off x="530304" y="2447714"/>
+            <a:ext cx="6703695" cy="800100"/>
           </a:xfrm>
         </p:spPr>
         <p:txBody>
@@ -1077,7 +1082,7 @@
           <a:lstStyle>
             <a:lvl1pPr marL="0" indent="0">
               <a:buNone/>
-              <a:defRPr sz="1792">
+              <a:defRPr sz="1280">
                 <a:solidFill>
                   <a:schemeClr val="tx1">
                     <a:tint val="75000"/>
@@ -1085,9 +1090,9 @@
                 </a:solidFill>
               </a:defRPr>
             </a:lvl1pPr>
-            <a:lvl2pPr marL="341300" indent="0">
-              <a:buNone/>
-              <a:defRPr sz="1493">
+            <a:lvl2pPr marL="243825" indent="0">
+              <a:buNone/>
+              <a:defRPr sz="1067">
                 <a:solidFill>
                   <a:schemeClr val="tx1">
                     <a:tint val="75000"/>
@@ -1095,9 +1100,9 @@
                 </a:solidFill>
               </a:defRPr>
             </a:lvl2pPr>
-            <a:lvl3pPr marL="682600" indent="0">
-              <a:buNone/>
-              <a:defRPr sz="1344">
+            <a:lvl3pPr marL="487650" indent="0">
+              <a:buNone/>
+              <a:defRPr sz="960">
                 <a:solidFill>
                   <a:schemeClr val="tx1">
                     <a:tint val="75000"/>
@@ -1105,9 +1110,9 @@
                 </a:solidFill>
               </a:defRPr>
             </a:lvl3pPr>
-            <a:lvl4pPr marL="1023899" indent="0">
-              <a:buNone/>
-              <a:defRPr sz="1194">
+            <a:lvl4pPr marL="731474" indent="0">
+              <a:buNone/>
+              <a:defRPr sz="853">
                 <a:solidFill>
                   <a:schemeClr val="tx1">
                     <a:tint val="75000"/>
@@ -1115,9 +1120,9 @@
                 </a:solidFill>
               </a:defRPr>
             </a:lvl4pPr>
-            <a:lvl5pPr marL="1365199" indent="0">
-              <a:buNone/>
-              <a:defRPr sz="1194">
+            <a:lvl5pPr marL="975299" indent="0">
+              <a:buNone/>
+              <a:defRPr sz="853">
                 <a:solidFill>
                   <a:schemeClr val="tx1">
                     <a:tint val="75000"/>
@@ -1125,9 +1130,9 @@
                 </a:solidFill>
               </a:defRPr>
             </a:lvl5pPr>
-            <a:lvl6pPr marL="1706499" indent="0">
-              <a:buNone/>
-              <a:defRPr sz="1194">
+            <a:lvl6pPr marL="1219124" indent="0">
+              <a:buNone/>
+              <a:defRPr sz="853">
                 <a:solidFill>
                   <a:schemeClr val="tx1">
                     <a:tint val="75000"/>
@@ -1135,9 +1140,9 @@
                 </a:solidFill>
               </a:defRPr>
             </a:lvl6pPr>
-            <a:lvl7pPr marL="2047799" indent="0">
-              <a:buNone/>
-              <a:defRPr sz="1194">
+            <a:lvl7pPr marL="1462949" indent="0">
+              <a:buNone/>
+              <a:defRPr sz="853">
                 <a:solidFill>
                   <a:schemeClr val="tx1">
                     <a:tint val="75000"/>
@@ -1145,9 +1150,9 @@
                 </a:solidFill>
               </a:defRPr>
             </a:lvl7pPr>
-            <a:lvl8pPr marL="2389099" indent="0">
-              <a:buNone/>
-              <a:defRPr sz="1194">
+            <a:lvl8pPr marL="1706773" indent="0">
+              <a:buNone/>
+              <a:defRPr sz="853">
                 <a:solidFill>
                   <a:schemeClr val="tx1">
                     <a:tint val="75000"/>
@@ -1155,9 +1160,9 @@
                 </a:solidFill>
               </a:defRPr>
             </a:lvl8pPr>
-            <a:lvl9pPr marL="2730398" indent="0">
-              <a:buNone/>
-              <a:defRPr sz="1194">
+            <a:lvl9pPr marL="1950598" indent="0">
+              <a:buNone/>
+              <a:defRPr sz="853">
                 <a:solidFill>
                   <a:schemeClr val="tx1">
                     <a:tint val="75000"/>
@@ -1192,7 +1197,7 @@
           <a:p>
             <a:fld id="{FC088DA2-E2B4-0147-A2CD-628931F110B8}" type="datetimeFigureOut">
               <a:rPr lang="en-US" smtClean="0"/>
-              <a:t>1/14/20</a:t>
+              <a:t>1/31/20</a:t>
             </a:fld>
             <a:endParaRPr lang="en-US"/>
           </a:p>
@@ -1243,7 +1248,7 @@
     </p:spTree>
     <p:extLst>
       <p:ext uri="{BB962C8B-B14F-4D97-AF65-F5344CB8AC3E}">
-        <p14:creationId xmlns:p14="http://schemas.microsoft.com/office/powerpoint/2010/main" val="3787072804"/>
+        <p14:creationId xmlns:p14="http://schemas.microsoft.com/office/powerpoint/2010/main" val="666610573"/>
       </p:ext>
     </p:extLst>
   </p:cSld>
@@ -1305,8 +1310,8 @@
         </p:nvSpPr>
         <p:spPr>
           <a:xfrm>
-            <a:off x="630724" y="1362880"/>
-            <a:ext cx="3899019" cy="3248395"/>
+            <a:off x="534353" y="973666"/>
+            <a:ext cx="3303270" cy="2320714"/>
           </a:xfrm>
         </p:spPr>
         <p:txBody>
@@ -1362,8 +1367,8 @@
         </p:nvSpPr>
         <p:spPr>
           <a:xfrm>
-            <a:off x="4644420" y="1362880"/>
-            <a:ext cx="3899019" cy="3248395"/>
+            <a:off x="3934778" y="973666"/>
+            <a:ext cx="3303270" cy="2320714"/>
           </a:xfrm>
         </p:spPr>
         <p:txBody>
@@ -1424,7 +1429,7 @@
           <a:p>
             <a:fld id="{FC088DA2-E2B4-0147-A2CD-628931F110B8}" type="datetimeFigureOut">
               <a:rPr lang="en-US" smtClean="0"/>
-              <a:t>1/14/20</a:t>
+              <a:t>1/31/20</a:t>
             </a:fld>
             <a:endParaRPr lang="en-US"/>
           </a:p>
@@ -1475,7 +1480,7 @@
     </p:spTree>
     <p:extLst>
       <p:ext uri="{BB962C8B-B14F-4D97-AF65-F5344CB8AC3E}">
-        <p14:creationId xmlns:p14="http://schemas.microsoft.com/office/powerpoint/2010/main" val="887037324"/>
+        <p14:creationId xmlns:p14="http://schemas.microsoft.com/office/powerpoint/2010/main" val="2635396009"/>
       </p:ext>
     </p:extLst>
   </p:cSld>
@@ -1514,8 +1519,8 @@
         </p:nvSpPr>
         <p:spPr>
           <a:xfrm>
-            <a:off x="631918" y="272576"/>
-            <a:ext cx="7912716" cy="989570"/>
+            <a:off x="535365" y="194734"/>
+            <a:ext cx="6703695" cy="706967"/>
           </a:xfrm>
         </p:spPr>
         <p:txBody>
@@ -1542,8 +1547,8 @@
         </p:nvSpPr>
         <p:spPr>
           <a:xfrm>
-            <a:off x="631919" y="1255035"/>
-            <a:ext cx="3881101" cy="615073"/>
+            <a:off x="535365" y="896620"/>
+            <a:ext cx="3288089" cy="439420"/>
           </a:xfrm>
         </p:spPr>
         <p:txBody>
@@ -1551,39 +1556,39 @@
           <a:lstStyle>
             <a:lvl1pPr marL="0" indent="0">
               <a:buNone/>
-              <a:defRPr sz="1792" b="1"/>
+              <a:defRPr sz="1280" b="1"/>
             </a:lvl1pPr>
-            <a:lvl2pPr marL="341300" indent="0">
-              <a:buNone/>
-              <a:defRPr sz="1493" b="1"/>
+            <a:lvl2pPr marL="243825" indent="0">
+              <a:buNone/>
+              <a:defRPr sz="1067" b="1"/>
             </a:lvl2pPr>
-            <a:lvl3pPr marL="682600" indent="0">
-              <a:buNone/>
-              <a:defRPr sz="1344" b="1"/>
+            <a:lvl3pPr marL="487650" indent="0">
+              <a:buNone/>
+              <a:defRPr sz="960" b="1"/>
             </a:lvl3pPr>
-            <a:lvl4pPr marL="1023899" indent="0">
-              <a:buNone/>
-              <a:defRPr sz="1194" b="1"/>
+            <a:lvl4pPr marL="731474" indent="0">
+              <a:buNone/>
+              <a:defRPr sz="853" b="1"/>
             </a:lvl4pPr>
-            <a:lvl5pPr marL="1365199" indent="0">
-              <a:buNone/>
-              <a:defRPr sz="1194" b="1"/>
+            <a:lvl5pPr marL="975299" indent="0">
+              <a:buNone/>
+              <a:defRPr sz="853" b="1"/>
             </a:lvl5pPr>
-            <a:lvl6pPr marL="1706499" indent="0">
-              <a:buNone/>
-              <a:defRPr sz="1194" b="1"/>
+            <a:lvl6pPr marL="1219124" indent="0">
+              <a:buNone/>
+              <a:defRPr sz="853" b="1"/>
             </a:lvl6pPr>
-            <a:lvl7pPr marL="2047799" indent="0">
-              <a:buNone/>
-              <a:defRPr sz="1194" b="1"/>
+            <a:lvl7pPr marL="1462949" indent="0">
+              <a:buNone/>
+              <a:defRPr sz="853" b="1"/>
             </a:lvl7pPr>
-            <a:lvl8pPr marL="2389099" indent="0">
-              <a:buNone/>
-              <a:defRPr sz="1194" b="1"/>
+            <a:lvl8pPr marL="1706773" indent="0">
+              <a:buNone/>
+              <a:defRPr sz="853" b="1"/>
             </a:lvl8pPr>
-            <a:lvl9pPr marL="2730398" indent="0">
-              <a:buNone/>
-              <a:defRPr sz="1194" b="1"/>
+            <a:lvl9pPr marL="1950598" indent="0">
+              <a:buNone/>
+              <a:defRPr sz="853" b="1"/>
             </a:lvl9pPr>
           </a:lstStyle>
           <a:p>
@@ -1607,8 +1612,8 @@
         </p:nvSpPr>
         <p:spPr>
           <a:xfrm>
-            <a:off x="631919" y="1870108"/>
-            <a:ext cx="3881101" cy="2750648"/>
+            <a:off x="535365" y="1336040"/>
+            <a:ext cx="3288089" cy="1965114"/>
           </a:xfrm>
         </p:spPr>
         <p:txBody>
@@ -1664,8 +1669,8 @@
         </p:nvSpPr>
         <p:spPr>
           <a:xfrm>
-            <a:off x="4644420" y="1255035"/>
-            <a:ext cx="3900214" cy="615073"/>
+            <a:off x="3934778" y="896620"/>
+            <a:ext cx="3304282" cy="439420"/>
           </a:xfrm>
         </p:spPr>
         <p:txBody>
@@ -1673,39 +1678,39 @@
           <a:lstStyle>
             <a:lvl1pPr marL="0" indent="0">
               <a:buNone/>
-              <a:defRPr sz="1792" b="1"/>
+              <a:defRPr sz="1280" b="1"/>
             </a:lvl1pPr>
-            <a:lvl2pPr marL="341300" indent="0">
-              <a:buNone/>
-              <a:defRPr sz="1493" b="1"/>
+            <a:lvl2pPr marL="243825" indent="0">
+              <a:buNone/>
+              <a:defRPr sz="1067" b="1"/>
             </a:lvl2pPr>
-            <a:lvl3pPr marL="682600" indent="0">
-              <a:buNone/>
-              <a:defRPr sz="1344" b="1"/>
+            <a:lvl3pPr marL="487650" indent="0">
+              <a:buNone/>
+              <a:defRPr sz="960" b="1"/>
             </a:lvl3pPr>
-            <a:lvl4pPr marL="1023899" indent="0">
-              <a:buNone/>
-              <a:defRPr sz="1194" b="1"/>
+            <a:lvl4pPr marL="731474" indent="0">
+              <a:buNone/>
+              <a:defRPr sz="853" b="1"/>
             </a:lvl4pPr>
-            <a:lvl5pPr marL="1365199" indent="0">
-              <a:buNone/>
-              <a:defRPr sz="1194" b="1"/>
+            <a:lvl5pPr marL="975299" indent="0">
+              <a:buNone/>
+              <a:defRPr sz="853" b="1"/>
             </a:lvl5pPr>
-            <a:lvl6pPr marL="1706499" indent="0">
-              <a:buNone/>
-              <a:defRPr sz="1194" b="1"/>
+            <a:lvl6pPr marL="1219124" indent="0">
+              <a:buNone/>
+              <a:defRPr sz="853" b="1"/>
             </a:lvl6pPr>
-            <a:lvl7pPr marL="2047799" indent="0">
-              <a:buNone/>
-              <a:defRPr sz="1194" b="1"/>
+            <a:lvl7pPr marL="1462949" indent="0">
+              <a:buNone/>
+              <a:defRPr sz="853" b="1"/>
             </a:lvl7pPr>
-            <a:lvl8pPr marL="2389099" indent="0">
-              <a:buNone/>
-              <a:defRPr sz="1194" b="1"/>
+            <a:lvl8pPr marL="1706773" indent="0">
+              <a:buNone/>
+              <a:defRPr sz="853" b="1"/>
             </a:lvl8pPr>
-            <a:lvl9pPr marL="2730398" indent="0">
-              <a:buNone/>
-              <a:defRPr sz="1194" b="1"/>
+            <a:lvl9pPr marL="1950598" indent="0">
+              <a:buNone/>
+              <a:defRPr sz="853" b="1"/>
             </a:lvl9pPr>
           </a:lstStyle>
           <a:p>
@@ -1729,8 +1734,8 @@
         </p:nvSpPr>
         <p:spPr>
           <a:xfrm>
-            <a:off x="4644420" y="1870108"/>
-            <a:ext cx="3900214" cy="2750648"/>
+            <a:off x="3934778" y="1336040"/>
+            <a:ext cx="3304282" cy="1965114"/>
           </a:xfrm>
         </p:spPr>
         <p:txBody>
@@ -1791,7 +1796,7 @@
           <a:p>
             <a:fld id="{FC088DA2-E2B4-0147-A2CD-628931F110B8}" type="datetimeFigureOut">
               <a:rPr lang="en-US" smtClean="0"/>
-              <a:t>1/14/20</a:t>
+              <a:t>1/31/20</a:t>
             </a:fld>
             <a:endParaRPr lang="en-US"/>
           </a:p>
@@ -1842,7 +1847,7 @@
     </p:spTree>
     <p:extLst>
       <p:ext uri="{BB962C8B-B14F-4D97-AF65-F5344CB8AC3E}">
-        <p14:creationId xmlns:p14="http://schemas.microsoft.com/office/powerpoint/2010/main" val="830846438"/>
+        <p14:creationId xmlns:p14="http://schemas.microsoft.com/office/powerpoint/2010/main" val="19296653"/>
       </p:ext>
     </p:extLst>
   </p:cSld>
@@ -1909,7 +1914,7 @@
           <a:p>
             <a:fld id="{FC088DA2-E2B4-0147-A2CD-628931F110B8}" type="datetimeFigureOut">
               <a:rPr lang="en-US" smtClean="0"/>
-              <a:t>1/14/20</a:t>
+              <a:t>1/31/20</a:t>
             </a:fld>
             <a:endParaRPr lang="en-US"/>
           </a:p>
@@ -1960,7 +1965,7 @@
     </p:spTree>
     <p:extLst>
       <p:ext uri="{BB962C8B-B14F-4D97-AF65-F5344CB8AC3E}">
-        <p14:creationId xmlns:p14="http://schemas.microsoft.com/office/powerpoint/2010/main" val="93189564"/>
+        <p14:creationId xmlns:p14="http://schemas.microsoft.com/office/powerpoint/2010/main" val="350152006"/>
       </p:ext>
     </p:extLst>
   </p:cSld>
@@ -2004,7 +2009,7 @@
           <a:p>
             <a:fld id="{FC088DA2-E2B4-0147-A2CD-628931F110B8}" type="datetimeFigureOut">
               <a:rPr lang="en-US" smtClean="0"/>
-              <a:t>1/14/20</a:t>
+              <a:t>1/31/20</a:t>
             </a:fld>
             <a:endParaRPr lang="en-US"/>
           </a:p>
@@ -2055,7 +2060,7 @@
     </p:spTree>
     <p:extLst>
       <p:ext uri="{BB962C8B-B14F-4D97-AF65-F5344CB8AC3E}">
-        <p14:creationId xmlns:p14="http://schemas.microsoft.com/office/powerpoint/2010/main" val="3823046003"/>
+        <p14:creationId xmlns:p14="http://schemas.microsoft.com/office/powerpoint/2010/main" val="1257476885"/>
       </p:ext>
     </p:extLst>
   </p:cSld>
@@ -2094,15 +2099,15 @@
         </p:nvSpPr>
         <p:spPr>
           <a:xfrm>
-            <a:off x="631919" y="341312"/>
-            <a:ext cx="2958906" cy="1194594"/>
+            <a:off x="535365" y="243840"/>
+            <a:ext cx="2506801" cy="853440"/>
           </a:xfrm>
         </p:spPr>
         <p:txBody>
           <a:bodyPr anchor="b"/>
           <a:lstStyle>
             <a:lvl1pPr>
-              <a:defRPr sz="2389"/>
+              <a:defRPr sz="1707"/>
             </a:lvl1pPr>
           </a:lstStyle>
           <a:p>
@@ -2126,39 +2131,39 @@
         </p:nvSpPr>
         <p:spPr>
           <a:xfrm>
-            <a:off x="3900214" y="737141"/>
-            <a:ext cx="4644420" cy="3638297"/>
+            <a:off x="3304282" y="526627"/>
+            <a:ext cx="3934778" cy="2599267"/>
           </a:xfrm>
         </p:spPr>
         <p:txBody>
           <a:bodyPr/>
           <a:lstStyle>
             <a:lvl1pPr>
-              <a:defRPr sz="2389"/>
+              <a:defRPr sz="1707"/>
             </a:lvl1pPr>
             <a:lvl2pPr>
-              <a:defRPr sz="2090"/>
+              <a:defRPr sz="1493"/>
             </a:lvl2pPr>
             <a:lvl3pPr>
-              <a:defRPr sz="1792"/>
+              <a:defRPr sz="1280"/>
             </a:lvl3pPr>
             <a:lvl4pPr>
-              <a:defRPr sz="1493"/>
+              <a:defRPr sz="1067"/>
             </a:lvl4pPr>
             <a:lvl5pPr>
-              <a:defRPr sz="1493"/>
+              <a:defRPr sz="1067"/>
             </a:lvl5pPr>
             <a:lvl6pPr>
-              <a:defRPr sz="1493"/>
+              <a:defRPr sz="1067"/>
             </a:lvl6pPr>
             <a:lvl7pPr>
-              <a:defRPr sz="1493"/>
+              <a:defRPr sz="1067"/>
             </a:lvl7pPr>
             <a:lvl8pPr>
-              <a:defRPr sz="1493"/>
+              <a:defRPr sz="1067"/>
             </a:lvl8pPr>
             <a:lvl9pPr>
-              <a:defRPr sz="1493"/>
+              <a:defRPr sz="1067"/>
             </a:lvl9pPr>
           </a:lstStyle>
           <a:p>
@@ -2211,8 +2216,8 @@
         </p:nvSpPr>
         <p:spPr>
           <a:xfrm>
-            <a:off x="631919" y="1535906"/>
-            <a:ext cx="2958906" cy="2845457"/>
+            <a:off x="535365" y="1097280"/>
+            <a:ext cx="2506801" cy="2032847"/>
           </a:xfrm>
         </p:spPr>
         <p:txBody>
@@ -2220,39 +2225,39 @@
           <a:lstStyle>
             <a:lvl1pPr marL="0" indent="0">
               <a:buNone/>
-              <a:defRPr sz="1194"/>
+              <a:defRPr sz="853"/>
             </a:lvl1pPr>
-            <a:lvl2pPr marL="341300" indent="0">
-              <a:buNone/>
-              <a:defRPr sz="1045"/>
+            <a:lvl2pPr marL="243825" indent="0">
+              <a:buNone/>
+              <a:defRPr sz="747"/>
             </a:lvl2pPr>
-            <a:lvl3pPr marL="682600" indent="0">
-              <a:buNone/>
-              <a:defRPr sz="896"/>
+            <a:lvl3pPr marL="487650" indent="0">
+              <a:buNone/>
+              <a:defRPr sz="640"/>
             </a:lvl3pPr>
-            <a:lvl4pPr marL="1023899" indent="0">
-              <a:buNone/>
-              <a:defRPr sz="747"/>
+            <a:lvl4pPr marL="731474" indent="0">
+              <a:buNone/>
+              <a:defRPr sz="533"/>
             </a:lvl4pPr>
-            <a:lvl5pPr marL="1365199" indent="0">
-              <a:buNone/>
-              <a:defRPr sz="747"/>
+            <a:lvl5pPr marL="975299" indent="0">
+              <a:buNone/>
+              <a:defRPr sz="533"/>
             </a:lvl5pPr>
-            <a:lvl6pPr marL="1706499" indent="0">
-              <a:buNone/>
-              <a:defRPr sz="747"/>
+            <a:lvl6pPr marL="1219124" indent="0">
+              <a:buNone/>
+              <a:defRPr sz="533"/>
             </a:lvl6pPr>
-            <a:lvl7pPr marL="2047799" indent="0">
-              <a:buNone/>
-              <a:defRPr sz="747"/>
+            <a:lvl7pPr marL="1462949" indent="0">
+              <a:buNone/>
+              <a:defRPr sz="533"/>
             </a:lvl7pPr>
-            <a:lvl8pPr marL="2389099" indent="0">
-              <a:buNone/>
-              <a:defRPr sz="747"/>
+            <a:lvl8pPr marL="1706773" indent="0">
+              <a:buNone/>
+              <a:defRPr sz="533"/>
             </a:lvl8pPr>
-            <a:lvl9pPr marL="2730398" indent="0">
-              <a:buNone/>
-              <a:defRPr sz="747"/>
+            <a:lvl9pPr marL="1950598" indent="0">
+              <a:buNone/>
+              <a:defRPr sz="533"/>
             </a:lvl9pPr>
           </a:lstStyle>
           <a:p>
@@ -2281,7 +2286,7 @@
           <a:p>
             <a:fld id="{FC088DA2-E2B4-0147-A2CD-628931F110B8}" type="datetimeFigureOut">
               <a:rPr lang="en-US" smtClean="0"/>
-              <a:t>1/14/20</a:t>
+              <a:t>1/31/20</a:t>
             </a:fld>
             <a:endParaRPr lang="en-US"/>
           </a:p>
@@ -2332,7 +2337,7 @@
     </p:spTree>
     <p:extLst>
       <p:ext uri="{BB962C8B-B14F-4D97-AF65-F5344CB8AC3E}">
-        <p14:creationId xmlns:p14="http://schemas.microsoft.com/office/powerpoint/2010/main" val="3610132025"/>
+        <p14:creationId xmlns:p14="http://schemas.microsoft.com/office/powerpoint/2010/main" val="801545089"/>
       </p:ext>
     </p:extLst>
   </p:cSld>
@@ -2371,15 +2376,15 @@
         </p:nvSpPr>
         <p:spPr>
           <a:xfrm>
-            <a:off x="631919" y="341312"/>
-            <a:ext cx="2958906" cy="1194594"/>
+            <a:off x="535365" y="243840"/>
+            <a:ext cx="2506801" cy="853440"/>
           </a:xfrm>
         </p:spPr>
         <p:txBody>
           <a:bodyPr anchor="b"/>
           <a:lstStyle>
             <a:lvl1pPr>
-              <a:defRPr sz="2389"/>
+              <a:defRPr sz="1707"/>
             </a:lvl1pPr>
           </a:lstStyle>
           <a:p>
@@ -2403,8 +2408,8 @@
         </p:nvSpPr>
         <p:spPr>
           <a:xfrm>
-            <a:off x="3900214" y="737141"/>
-            <a:ext cx="4644420" cy="3638297"/>
+            <a:off x="3304282" y="526627"/>
+            <a:ext cx="3934778" cy="2599267"/>
           </a:xfrm>
         </p:spPr>
         <p:txBody>
@@ -2412,39 +2417,39 @@
           <a:lstStyle>
             <a:lvl1pPr marL="0" indent="0">
               <a:buNone/>
-              <a:defRPr sz="2389"/>
+              <a:defRPr sz="1707"/>
             </a:lvl1pPr>
-            <a:lvl2pPr marL="341300" indent="0">
-              <a:buNone/>
-              <a:defRPr sz="2090"/>
+            <a:lvl2pPr marL="243825" indent="0">
+              <a:buNone/>
+              <a:defRPr sz="1493"/>
             </a:lvl2pPr>
-            <a:lvl3pPr marL="682600" indent="0">
-              <a:buNone/>
-              <a:defRPr sz="1792"/>
+            <a:lvl3pPr marL="487650" indent="0">
+              <a:buNone/>
+              <a:defRPr sz="1280"/>
             </a:lvl3pPr>
-            <a:lvl4pPr marL="1023899" indent="0">
-              <a:buNone/>
-              <a:defRPr sz="1493"/>
+            <a:lvl4pPr marL="731474" indent="0">
+              <a:buNone/>
+              <a:defRPr sz="1067"/>
             </a:lvl4pPr>
-            <a:lvl5pPr marL="1365199" indent="0">
-              <a:buNone/>
-              <a:defRPr sz="1493"/>
+            <a:lvl5pPr marL="975299" indent="0">
+              <a:buNone/>
+              <a:defRPr sz="1067"/>
             </a:lvl5pPr>
-            <a:lvl6pPr marL="1706499" indent="0">
-              <a:buNone/>
-              <a:defRPr sz="1493"/>
+            <a:lvl6pPr marL="1219124" indent="0">
+              <a:buNone/>
+              <a:defRPr sz="1067"/>
             </a:lvl6pPr>
-            <a:lvl7pPr marL="2047799" indent="0">
-              <a:buNone/>
-              <a:defRPr sz="1493"/>
+            <a:lvl7pPr marL="1462949" indent="0">
+              <a:buNone/>
+              <a:defRPr sz="1067"/>
             </a:lvl7pPr>
-            <a:lvl8pPr marL="2389099" indent="0">
-              <a:buNone/>
-              <a:defRPr sz="1493"/>
+            <a:lvl8pPr marL="1706773" indent="0">
+              <a:buNone/>
+              <a:defRPr sz="1067"/>
             </a:lvl8pPr>
-            <a:lvl9pPr marL="2730398" indent="0">
-              <a:buNone/>
-              <a:defRPr sz="1493"/>
+            <a:lvl9pPr marL="1950598" indent="0">
+              <a:buNone/>
+              <a:defRPr sz="1067"/>
             </a:lvl9pPr>
           </a:lstStyle>
           <a:p>
@@ -2468,8 +2473,8 @@
         </p:nvSpPr>
         <p:spPr>
           <a:xfrm>
-            <a:off x="631919" y="1535906"/>
-            <a:ext cx="2958906" cy="2845457"/>
+            <a:off x="535365" y="1097280"/>
+            <a:ext cx="2506801" cy="2032847"/>
           </a:xfrm>
         </p:spPr>
         <p:txBody>
@@ -2477,39 +2482,39 @@
           <a:lstStyle>
             <a:lvl1pPr marL="0" indent="0">
               <a:buNone/>
-              <a:defRPr sz="1194"/>
+              <a:defRPr sz="853"/>
             </a:lvl1pPr>
-            <a:lvl2pPr marL="341300" indent="0">
-              <a:buNone/>
-              <a:defRPr sz="1045"/>
+            <a:lvl2pPr marL="243825" indent="0">
+              <a:buNone/>
+              <a:defRPr sz="747"/>
             </a:lvl2pPr>
-            <a:lvl3pPr marL="682600" indent="0">
-              <a:buNone/>
-              <a:defRPr sz="896"/>
+            <a:lvl3pPr marL="487650" indent="0">
+              <a:buNone/>
+              <a:defRPr sz="640"/>
             </a:lvl3pPr>
-            <a:lvl4pPr marL="1023899" indent="0">
-              <a:buNone/>
-              <a:defRPr sz="747"/>
+            <a:lvl4pPr marL="731474" indent="0">
+              <a:buNone/>
+              <a:defRPr sz="533"/>
             </a:lvl4pPr>
-            <a:lvl5pPr marL="1365199" indent="0">
-              <a:buNone/>
-              <a:defRPr sz="747"/>
+            <a:lvl5pPr marL="975299" indent="0">
+              <a:buNone/>
+              <a:defRPr sz="533"/>
             </a:lvl5pPr>
-            <a:lvl6pPr marL="1706499" indent="0">
-              <a:buNone/>
-              <a:defRPr sz="747"/>
+            <a:lvl6pPr marL="1219124" indent="0">
+              <a:buNone/>
+              <a:defRPr sz="533"/>
             </a:lvl6pPr>
-            <a:lvl7pPr marL="2047799" indent="0">
-              <a:buNone/>
-              <a:defRPr sz="747"/>
+            <a:lvl7pPr marL="1462949" indent="0">
+              <a:buNone/>
+              <a:defRPr sz="533"/>
             </a:lvl7pPr>
-            <a:lvl8pPr marL="2389099" indent="0">
-              <a:buNone/>
-              <a:defRPr sz="747"/>
+            <a:lvl8pPr marL="1706773" indent="0">
+              <a:buNone/>
+              <a:defRPr sz="533"/>
             </a:lvl8pPr>
-            <a:lvl9pPr marL="2730398" indent="0">
-              <a:buNone/>
-              <a:defRPr sz="747"/>
+            <a:lvl9pPr marL="1950598" indent="0">
+              <a:buNone/>
+              <a:defRPr sz="533"/>
             </a:lvl9pPr>
           </a:lstStyle>
           <a:p>
@@ -2538,7 +2543,7 @@
           <a:p>
             <a:fld id="{FC088DA2-E2B4-0147-A2CD-628931F110B8}" type="datetimeFigureOut">
               <a:rPr lang="en-US" smtClean="0"/>
-              <a:t>1/14/20</a:t>
+              <a:t>1/31/20</a:t>
             </a:fld>
             <a:endParaRPr lang="en-US"/>
           </a:p>
@@ -2589,7 +2594,7 @@
     </p:spTree>
     <p:extLst>
       <p:ext uri="{BB962C8B-B14F-4D97-AF65-F5344CB8AC3E}">
-        <p14:creationId xmlns:p14="http://schemas.microsoft.com/office/powerpoint/2010/main" val="3324545043"/>
+        <p14:creationId xmlns:p14="http://schemas.microsoft.com/office/powerpoint/2010/main" val="314120361"/>
       </p:ext>
     </p:extLst>
   </p:cSld>
@@ -2633,8 +2638,8 @@
         </p:nvSpPr>
         <p:spPr>
           <a:xfrm>
-            <a:off x="630724" y="272576"/>
-            <a:ext cx="7912716" cy="989570"/>
+            <a:off x="534353" y="194734"/>
+            <a:ext cx="6703695" cy="706967"/>
           </a:xfrm>
           <a:prstGeom prst="rect">
             <a:avLst/>
@@ -2666,8 +2671,8 @@
         </p:nvSpPr>
         <p:spPr>
           <a:xfrm>
-            <a:off x="630724" y="1362880"/>
-            <a:ext cx="7912716" cy="3248395"/>
+            <a:off x="534353" y="973666"/>
+            <a:ext cx="6703695" cy="2320714"/>
           </a:xfrm>
           <a:prstGeom prst="rect">
             <a:avLst/>
@@ -2728,8 +2733,8 @@
         </p:nvSpPr>
         <p:spPr>
           <a:xfrm>
-            <a:off x="630724" y="4745193"/>
-            <a:ext cx="2064187" cy="272576"/>
+            <a:off x="534353" y="3390054"/>
+            <a:ext cx="1748790" cy="194733"/>
           </a:xfrm>
           <a:prstGeom prst="rect">
             <a:avLst/>
@@ -2739,7 +2744,7 @@
           <a:bodyPr vert="horz" lIns="91440" tIns="45720" rIns="91440" bIns="45720" rtlCol="0" anchor="ctr"/>
           <a:lstStyle>
             <a:lvl1pPr algn="l">
-              <a:defRPr sz="896">
+              <a:defRPr sz="640">
                 <a:solidFill>
                   <a:schemeClr val="tx1">
                     <a:tint val="75000"/>
@@ -2751,7 +2756,7 @@
           <a:p>
             <a:fld id="{FC088DA2-E2B4-0147-A2CD-628931F110B8}" type="datetimeFigureOut">
               <a:rPr lang="en-US" smtClean="0"/>
-              <a:t>1/14/20</a:t>
+              <a:t>1/31/20</a:t>
             </a:fld>
             <a:endParaRPr lang="en-US"/>
           </a:p>
@@ -2769,8 +2774,8 @@
         </p:nvSpPr>
         <p:spPr>
           <a:xfrm>
-            <a:off x="3038942" y="4745193"/>
-            <a:ext cx="3096280" cy="272576"/>
+            <a:off x="2574608" y="3390054"/>
+            <a:ext cx="2623185" cy="194733"/>
           </a:xfrm>
           <a:prstGeom prst="rect">
             <a:avLst/>
@@ -2780,7 +2785,7 @@
           <a:bodyPr vert="horz" lIns="91440" tIns="45720" rIns="91440" bIns="45720" rtlCol="0" anchor="ctr"/>
           <a:lstStyle>
             <a:lvl1pPr algn="ctr">
-              <a:defRPr sz="896">
+              <a:defRPr sz="640">
                 <a:solidFill>
                   <a:schemeClr val="tx1">
                     <a:tint val="75000"/>
@@ -2806,8 +2811,8 @@
         </p:nvSpPr>
         <p:spPr>
           <a:xfrm>
-            <a:off x="6479252" y="4745193"/>
-            <a:ext cx="2064187" cy="272576"/>
+            <a:off x="5489258" y="3390054"/>
+            <a:ext cx="1748790" cy="194733"/>
           </a:xfrm>
           <a:prstGeom prst="rect">
             <a:avLst/>
@@ -2817,7 +2822,7 @@
           <a:bodyPr vert="horz" lIns="91440" tIns="45720" rIns="91440" bIns="45720" rtlCol="0" anchor="ctr"/>
           <a:lstStyle>
             <a:lvl1pPr algn="r">
-              <a:defRPr sz="896">
+              <a:defRPr sz="640">
                 <a:solidFill>
                   <a:schemeClr val="tx1">
                     <a:tint val="75000"/>
@@ -2838,28 +2843,28 @@
     </p:spTree>
     <p:extLst>
       <p:ext uri="{BB962C8B-B14F-4D97-AF65-F5344CB8AC3E}">
-        <p14:creationId xmlns:p14="http://schemas.microsoft.com/office/powerpoint/2010/main" val="1944295172"/>
+        <p14:creationId xmlns:p14="http://schemas.microsoft.com/office/powerpoint/2010/main" val="862879211"/>
       </p:ext>
     </p:extLst>
   </p:cSld>
   <p:clrMap bg1="lt1" tx1="dk1" bg2="lt2" tx2="dk2" accent1="accent1" accent2="accent2" accent3="accent3" accent4="accent4" accent5="accent5" accent6="accent6" hlink="hlink" folHlink="folHlink"/>
   <p:sldLayoutIdLst>
-    <p:sldLayoutId id="2147483675" r:id="rId1"/>
-    <p:sldLayoutId id="2147483676" r:id="rId2"/>
-    <p:sldLayoutId id="2147483677" r:id="rId3"/>
-    <p:sldLayoutId id="2147483678" r:id="rId4"/>
-    <p:sldLayoutId id="2147483679" r:id="rId5"/>
-    <p:sldLayoutId id="2147483680" r:id="rId6"/>
-    <p:sldLayoutId id="2147483681" r:id="rId7"/>
-    <p:sldLayoutId id="2147483682" r:id="rId8"/>
-    <p:sldLayoutId id="2147483683" r:id="rId9"/>
-    <p:sldLayoutId id="2147483684" r:id="rId10"/>
-    <p:sldLayoutId id="2147483685" r:id="rId11"/>
-    <p:sldLayoutId id="2147483686" r:id="rId12"/>
+    <p:sldLayoutId id="2147483701" r:id="rId1"/>
+    <p:sldLayoutId id="2147483702" r:id="rId2"/>
+    <p:sldLayoutId id="2147483703" r:id="rId3"/>
+    <p:sldLayoutId id="2147483704" r:id="rId4"/>
+    <p:sldLayoutId id="2147483705" r:id="rId5"/>
+    <p:sldLayoutId id="2147483706" r:id="rId6"/>
+    <p:sldLayoutId id="2147483707" r:id="rId7"/>
+    <p:sldLayoutId id="2147483708" r:id="rId8"/>
+    <p:sldLayoutId id="2147483709" r:id="rId9"/>
+    <p:sldLayoutId id="2147483710" r:id="rId10"/>
+    <p:sldLayoutId id="2147483711" r:id="rId11"/>
+    <p:sldLayoutId id="2147483712" r:id="rId12"/>
   </p:sldLayoutIdLst>
   <p:txStyles>
     <p:titleStyle>
-      <a:lvl1pPr algn="l" defTabSz="682600" rtl="0" eaLnBrk="1" latinLnBrk="0" hangingPunct="1">
+      <a:lvl1pPr algn="l" defTabSz="487650" rtl="0" eaLnBrk="1" latinLnBrk="0" hangingPunct="1">
         <a:lnSpc>
           <a:spcPct val="90000"/>
         </a:lnSpc>
@@ -2867,7 +2872,7 @@
           <a:spcPct val="0"/>
         </a:spcBef>
         <a:buNone/>
-        <a:defRPr sz="3285" kern="1200">
+        <a:defRPr sz="2347" kern="1200">
           <a:solidFill>
             <a:schemeClr val="tx1"/>
           </a:solidFill>
@@ -2878,48 +2883,12 @@
       </a:lvl1pPr>
     </p:titleStyle>
     <p:bodyStyle>
-      <a:lvl1pPr marL="170650" indent="-170650" algn="l" defTabSz="682600" rtl="0" eaLnBrk="1" latinLnBrk="0" hangingPunct="1">
+      <a:lvl1pPr marL="121912" indent="-121912" algn="l" defTabSz="487650" rtl="0" eaLnBrk="1" latinLnBrk="0" hangingPunct="1">
         <a:lnSpc>
           <a:spcPct val="90000"/>
         </a:lnSpc>
         <a:spcBef>
-          <a:spcPts val="747"/>
-        </a:spcBef>
-        <a:buFont typeface="Arial" panose="020B0604020202020204" pitchFamily="34" charset="0"/>
-        <a:buChar char="•"/>
-        <a:defRPr sz="2090" kern="1200">
-          <a:solidFill>
-            <a:schemeClr val="tx1"/>
-          </a:solidFill>
-          <a:latin typeface="+mn-lt"/>
-          <a:ea typeface="+mn-ea"/>
-          <a:cs typeface="+mn-cs"/>
-        </a:defRPr>
-      </a:lvl1pPr>
-      <a:lvl2pPr marL="511950" indent="-170650" algn="l" defTabSz="682600" rtl="0" eaLnBrk="1" latinLnBrk="0" hangingPunct="1">
-        <a:lnSpc>
-          <a:spcPct val="90000"/>
-        </a:lnSpc>
-        <a:spcBef>
-          <a:spcPts val="373"/>
-        </a:spcBef>
-        <a:buFont typeface="Arial" panose="020B0604020202020204" pitchFamily="34" charset="0"/>
-        <a:buChar char="•"/>
-        <a:defRPr sz="1792" kern="1200">
-          <a:solidFill>
-            <a:schemeClr val="tx1"/>
-          </a:solidFill>
-          <a:latin typeface="+mn-lt"/>
-          <a:ea typeface="+mn-ea"/>
-          <a:cs typeface="+mn-cs"/>
-        </a:defRPr>
-      </a:lvl2pPr>
-      <a:lvl3pPr marL="853250" indent="-170650" algn="l" defTabSz="682600" rtl="0" eaLnBrk="1" latinLnBrk="0" hangingPunct="1">
-        <a:lnSpc>
-          <a:spcPct val="90000"/>
-        </a:lnSpc>
-        <a:spcBef>
-          <a:spcPts val="373"/>
+          <a:spcPts val="533"/>
         </a:spcBef>
         <a:buFont typeface="Arial" panose="020B0604020202020204" pitchFamily="34" charset="0"/>
         <a:buChar char="•"/>
@@ -2931,17 +2900,53 @@
           <a:ea typeface="+mn-ea"/>
           <a:cs typeface="+mn-cs"/>
         </a:defRPr>
-      </a:lvl3pPr>
-      <a:lvl4pPr marL="1194549" indent="-170650" algn="l" defTabSz="682600" rtl="0" eaLnBrk="1" latinLnBrk="0" hangingPunct="1">
+      </a:lvl1pPr>
+      <a:lvl2pPr marL="365737" indent="-121912" algn="l" defTabSz="487650" rtl="0" eaLnBrk="1" latinLnBrk="0" hangingPunct="1">
         <a:lnSpc>
           <a:spcPct val="90000"/>
         </a:lnSpc>
         <a:spcBef>
-          <a:spcPts val="373"/>
+          <a:spcPts val="267"/>
         </a:spcBef>
         <a:buFont typeface="Arial" panose="020B0604020202020204" pitchFamily="34" charset="0"/>
         <a:buChar char="•"/>
-        <a:defRPr sz="1344" kern="1200">
+        <a:defRPr sz="1280" kern="1200">
+          <a:solidFill>
+            <a:schemeClr val="tx1"/>
+          </a:solidFill>
+          <a:latin typeface="+mn-lt"/>
+          <a:ea typeface="+mn-ea"/>
+          <a:cs typeface="+mn-cs"/>
+        </a:defRPr>
+      </a:lvl2pPr>
+      <a:lvl3pPr marL="609562" indent="-121912" algn="l" defTabSz="487650" rtl="0" eaLnBrk="1" latinLnBrk="0" hangingPunct="1">
+        <a:lnSpc>
+          <a:spcPct val="90000"/>
+        </a:lnSpc>
+        <a:spcBef>
+          <a:spcPts val="267"/>
+        </a:spcBef>
+        <a:buFont typeface="Arial" panose="020B0604020202020204" pitchFamily="34" charset="0"/>
+        <a:buChar char="•"/>
+        <a:defRPr sz="1067" kern="1200">
+          <a:solidFill>
+            <a:schemeClr val="tx1"/>
+          </a:solidFill>
+          <a:latin typeface="+mn-lt"/>
+          <a:ea typeface="+mn-ea"/>
+          <a:cs typeface="+mn-cs"/>
+        </a:defRPr>
+      </a:lvl3pPr>
+      <a:lvl4pPr marL="853387" indent="-121912" algn="l" defTabSz="487650" rtl="0" eaLnBrk="1" latinLnBrk="0" hangingPunct="1">
+        <a:lnSpc>
+          <a:spcPct val="90000"/>
+        </a:lnSpc>
+        <a:spcBef>
+          <a:spcPts val="267"/>
+        </a:spcBef>
+        <a:buFont typeface="Arial" panose="020B0604020202020204" pitchFamily="34" charset="0"/>
+        <a:buChar char="•"/>
+        <a:defRPr sz="960" kern="1200">
           <a:solidFill>
             <a:schemeClr val="tx1"/>
           </a:solidFill>
@@ -2950,16 +2955,16 @@
           <a:cs typeface="+mn-cs"/>
         </a:defRPr>
       </a:lvl4pPr>
-      <a:lvl5pPr marL="1535849" indent="-170650" algn="l" defTabSz="682600" rtl="0" eaLnBrk="1" latinLnBrk="0" hangingPunct="1">
+      <a:lvl5pPr marL="1097211" indent="-121912" algn="l" defTabSz="487650" rtl="0" eaLnBrk="1" latinLnBrk="0" hangingPunct="1">
         <a:lnSpc>
           <a:spcPct val="90000"/>
         </a:lnSpc>
         <a:spcBef>
-          <a:spcPts val="373"/>
+          <a:spcPts val="267"/>
         </a:spcBef>
         <a:buFont typeface="Arial" panose="020B0604020202020204" pitchFamily="34" charset="0"/>
         <a:buChar char="•"/>
-        <a:defRPr sz="1344" kern="1200">
+        <a:defRPr sz="960" kern="1200">
           <a:solidFill>
             <a:schemeClr val="tx1"/>
           </a:solidFill>
@@ -2968,16 +2973,16 @@
           <a:cs typeface="+mn-cs"/>
         </a:defRPr>
       </a:lvl5pPr>
-      <a:lvl6pPr marL="1877149" indent="-170650" algn="l" defTabSz="682600" rtl="0" eaLnBrk="1" latinLnBrk="0" hangingPunct="1">
+      <a:lvl6pPr marL="1341036" indent="-121912" algn="l" defTabSz="487650" rtl="0" eaLnBrk="1" latinLnBrk="0" hangingPunct="1">
         <a:lnSpc>
           <a:spcPct val="90000"/>
         </a:lnSpc>
         <a:spcBef>
-          <a:spcPts val="373"/>
+          <a:spcPts val="267"/>
         </a:spcBef>
         <a:buFont typeface="Arial" panose="020B0604020202020204" pitchFamily="34" charset="0"/>
         <a:buChar char="•"/>
-        <a:defRPr sz="1344" kern="1200">
+        <a:defRPr sz="960" kern="1200">
           <a:solidFill>
             <a:schemeClr val="tx1"/>
           </a:solidFill>
@@ -2986,16 +2991,16 @@
           <a:cs typeface="+mn-cs"/>
         </a:defRPr>
       </a:lvl6pPr>
-      <a:lvl7pPr marL="2218449" indent="-170650" algn="l" defTabSz="682600" rtl="0" eaLnBrk="1" latinLnBrk="0" hangingPunct="1">
+      <a:lvl7pPr marL="1584861" indent="-121912" algn="l" defTabSz="487650" rtl="0" eaLnBrk="1" latinLnBrk="0" hangingPunct="1">
         <a:lnSpc>
           <a:spcPct val="90000"/>
         </a:lnSpc>
         <a:spcBef>
-          <a:spcPts val="373"/>
+          <a:spcPts val="267"/>
         </a:spcBef>
         <a:buFont typeface="Arial" panose="020B0604020202020204" pitchFamily="34" charset="0"/>
         <a:buChar char="•"/>
-        <a:defRPr sz="1344" kern="1200">
+        <a:defRPr sz="960" kern="1200">
           <a:solidFill>
             <a:schemeClr val="tx1"/>
           </a:solidFill>
@@ -3004,16 +3009,16 @@
           <a:cs typeface="+mn-cs"/>
         </a:defRPr>
       </a:lvl7pPr>
-      <a:lvl8pPr marL="2559749" indent="-170650" algn="l" defTabSz="682600" rtl="0" eaLnBrk="1" latinLnBrk="0" hangingPunct="1">
+      <a:lvl8pPr marL="1828686" indent="-121912" algn="l" defTabSz="487650" rtl="0" eaLnBrk="1" latinLnBrk="0" hangingPunct="1">
         <a:lnSpc>
           <a:spcPct val="90000"/>
         </a:lnSpc>
         <a:spcBef>
-          <a:spcPts val="373"/>
+          <a:spcPts val="267"/>
         </a:spcBef>
         <a:buFont typeface="Arial" panose="020B0604020202020204" pitchFamily="34" charset="0"/>
         <a:buChar char="•"/>
-        <a:defRPr sz="1344" kern="1200">
+        <a:defRPr sz="960" kern="1200">
           <a:solidFill>
             <a:schemeClr val="tx1"/>
           </a:solidFill>
@@ -3022,16 +3027,16 @@
           <a:cs typeface="+mn-cs"/>
         </a:defRPr>
       </a:lvl8pPr>
-      <a:lvl9pPr marL="2901048" indent="-170650" algn="l" defTabSz="682600" rtl="0" eaLnBrk="1" latinLnBrk="0" hangingPunct="1">
+      <a:lvl9pPr marL="2072510" indent="-121912" algn="l" defTabSz="487650" rtl="0" eaLnBrk="1" latinLnBrk="0" hangingPunct="1">
         <a:lnSpc>
           <a:spcPct val="90000"/>
         </a:lnSpc>
         <a:spcBef>
-          <a:spcPts val="373"/>
+          <a:spcPts val="267"/>
         </a:spcBef>
         <a:buFont typeface="Arial" panose="020B0604020202020204" pitchFamily="34" charset="0"/>
         <a:buChar char="•"/>
-        <a:defRPr sz="1344" kern="1200">
+        <a:defRPr sz="960" kern="1200">
           <a:solidFill>
             <a:schemeClr val="tx1"/>
           </a:solidFill>
@@ -3045,8 +3050,8 @@
       <a:defPPr>
         <a:defRPr lang="en-US"/>
       </a:defPPr>
-      <a:lvl1pPr marL="0" algn="l" defTabSz="682600" rtl="0" eaLnBrk="1" latinLnBrk="0" hangingPunct="1">
-        <a:defRPr sz="1344" kern="1200">
+      <a:lvl1pPr marL="0" algn="l" defTabSz="487650" rtl="0" eaLnBrk="1" latinLnBrk="0" hangingPunct="1">
+        <a:defRPr sz="960" kern="1200">
           <a:solidFill>
             <a:schemeClr val="tx1"/>
           </a:solidFill>
@@ -3055,8 +3060,8 @@
           <a:cs typeface="+mn-cs"/>
         </a:defRPr>
       </a:lvl1pPr>
-      <a:lvl2pPr marL="341300" algn="l" defTabSz="682600" rtl="0" eaLnBrk="1" latinLnBrk="0" hangingPunct="1">
-        <a:defRPr sz="1344" kern="1200">
+      <a:lvl2pPr marL="243825" algn="l" defTabSz="487650" rtl="0" eaLnBrk="1" latinLnBrk="0" hangingPunct="1">
+        <a:defRPr sz="960" kern="1200">
           <a:solidFill>
             <a:schemeClr val="tx1"/>
           </a:solidFill>
@@ -3065,8 +3070,8 @@
           <a:cs typeface="+mn-cs"/>
         </a:defRPr>
       </a:lvl2pPr>
-      <a:lvl3pPr marL="682600" algn="l" defTabSz="682600" rtl="0" eaLnBrk="1" latinLnBrk="0" hangingPunct="1">
-        <a:defRPr sz="1344" kern="1200">
+      <a:lvl3pPr marL="487650" algn="l" defTabSz="487650" rtl="0" eaLnBrk="1" latinLnBrk="0" hangingPunct="1">
+        <a:defRPr sz="960" kern="1200">
           <a:solidFill>
             <a:schemeClr val="tx1"/>
           </a:solidFill>
@@ -3075,8 +3080,8 @@
           <a:cs typeface="+mn-cs"/>
         </a:defRPr>
       </a:lvl3pPr>
-      <a:lvl4pPr marL="1023899" algn="l" defTabSz="682600" rtl="0" eaLnBrk="1" latinLnBrk="0" hangingPunct="1">
-        <a:defRPr sz="1344" kern="1200">
+      <a:lvl4pPr marL="731474" algn="l" defTabSz="487650" rtl="0" eaLnBrk="1" latinLnBrk="0" hangingPunct="1">
+        <a:defRPr sz="960" kern="1200">
           <a:solidFill>
             <a:schemeClr val="tx1"/>
           </a:solidFill>
@@ -3085,8 +3090,8 @@
           <a:cs typeface="+mn-cs"/>
         </a:defRPr>
       </a:lvl4pPr>
-      <a:lvl5pPr marL="1365199" algn="l" defTabSz="682600" rtl="0" eaLnBrk="1" latinLnBrk="0" hangingPunct="1">
-        <a:defRPr sz="1344" kern="1200">
+      <a:lvl5pPr marL="975299" algn="l" defTabSz="487650" rtl="0" eaLnBrk="1" latinLnBrk="0" hangingPunct="1">
+        <a:defRPr sz="960" kern="1200">
           <a:solidFill>
             <a:schemeClr val="tx1"/>
           </a:solidFill>
@@ -3095,8 +3100,8 @@
           <a:cs typeface="+mn-cs"/>
         </a:defRPr>
       </a:lvl5pPr>
-      <a:lvl6pPr marL="1706499" algn="l" defTabSz="682600" rtl="0" eaLnBrk="1" latinLnBrk="0" hangingPunct="1">
-        <a:defRPr sz="1344" kern="1200">
+      <a:lvl6pPr marL="1219124" algn="l" defTabSz="487650" rtl="0" eaLnBrk="1" latinLnBrk="0" hangingPunct="1">
+        <a:defRPr sz="960" kern="1200">
           <a:solidFill>
             <a:schemeClr val="tx1"/>
           </a:solidFill>
@@ -3105,8 +3110,8 @@
           <a:cs typeface="+mn-cs"/>
         </a:defRPr>
       </a:lvl6pPr>
-      <a:lvl7pPr marL="2047799" algn="l" defTabSz="682600" rtl="0" eaLnBrk="1" latinLnBrk="0" hangingPunct="1">
-        <a:defRPr sz="1344" kern="1200">
+      <a:lvl7pPr marL="1462949" algn="l" defTabSz="487650" rtl="0" eaLnBrk="1" latinLnBrk="0" hangingPunct="1">
+        <a:defRPr sz="960" kern="1200">
           <a:solidFill>
             <a:schemeClr val="tx1"/>
           </a:solidFill>
@@ -3115,8 +3120,8 @@
           <a:cs typeface="+mn-cs"/>
         </a:defRPr>
       </a:lvl7pPr>
-      <a:lvl8pPr marL="2389099" algn="l" defTabSz="682600" rtl="0" eaLnBrk="1" latinLnBrk="0" hangingPunct="1">
-        <a:defRPr sz="1344" kern="1200">
+      <a:lvl8pPr marL="1706773" algn="l" defTabSz="487650" rtl="0" eaLnBrk="1" latinLnBrk="0" hangingPunct="1">
+        <a:defRPr sz="960" kern="1200">
           <a:solidFill>
             <a:schemeClr val="tx1"/>
           </a:solidFill>
@@ -3125,8 +3130,8 @@
           <a:cs typeface="+mn-cs"/>
         </a:defRPr>
       </a:lvl8pPr>
-      <a:lvl9pPr marL="2730398" algn="l" defTabSz="682600" rtl="0" eaLnBrk="1" latinLnBrk="0" hangingPunct="1">
-        <a:defRPr sz="1344" kern="1200">
+      <a:lvl9pPr marL="1950598" algn="l" defTabSz="487650" rtl="0" eaLnBrk="1" latinLnBrk="0" hangingPunct="1">
+        <a:defRPr sz="960" kern="1200">
           <a:solidFill>
             <a:schemeClr val="tx1"/>
           </a:solidFill>
@@ -3171,17 +3176,13 @@
         </p:nvSpPr>
         <p:spPr>
           <a:xfrm>
-            <a:off x="6838606" y="2328416"/>
-            <a:ext cx="1677080" cy="497572"/>
+            <a:off x="4133700" y="1352579"/>
+            <a:ext cx="1677080" cy="1261314"/>
           </a:xfrm>
           <a:prstGeom prst="rect">
             <a:avLst/>
           </a:prstGeom>
-          <a:solidFill>
-            <a:srgbClr val="70AD47">
-              <a:lumMod val="75000"/>
-            </a:srgbClr>
-          </a:solidFill>
+          <a:noFill/>
           <a:ln w="12700" cap="flat" cmpd="sng" algn="ctr">
             <a:solidFill>
               <a:srgbClr val="5B9BD5">
@@ -3223,17 +3224,13 @@
         </p:nvSpPr>
         <p:spPr>
           <a:xfrm>
-            <a:off x="5099627" y="2328416"/>
-            <a:ext cx="1677080" cy="497572"/>
+            <a:off x="5866354" y="1353121"/>
+            <a:ext cx="1677080" cy="1260772"/>
           </a:xfrm>
           <a:prstGeom prst="rect">
             <a:avLst/>
           </a:prstGeom>
-          <a:solidFill>
-            <a:srgbClr val="70AD47">
-              <a:lumMod val="75000"/>
-            </a:srgbClr>
-          </a:solidFill>
+          <a:noFill/>
           <a:ln w="12700" cap="flat" cmpd="sng" algn="ctr">
             <a:solidFill>
               <a:srgbClr val="5B9BD5">
@@ -3289,8 +3286,8 @@
         </p:blipFill>
         <p:spPr>
           <a:xfrm>
-            <a:off x="5348493" y="2328417"/>
-            <a:ext cx="1175627" cy="484679"/>
+            <a:off x="5867618" y="1659299"/>
+            <a:ext cx="1670455" cy="688683"/>
           </a:xfrm>
           <a:prstGeom prst="rect">
             <a:avLst/>
@@ -3311,16 +3308,14 @@
         </p:nvSpPr>
         <p:spPr>
           <a:xfrm>
-            <a:off x="1562485" y="273520"/>
+            <a:off x="1119673" y="227477"/>
             <a:ext cx="1677080" cy="497572"/>
           </a:xfrm>
           <a:prstGeom prst="rect">
             <a:avLst/>
           </a:prstGeom>
           <a:solidFill>
-            <a:srgbClr val="70AD47">
-              <a:lumMod val="75000"/>
-            </a:srgbClr>
+            <a:schemeClr val="accent1"/>
           </a:solidFill>
           <a:ln w="12700" cap="flat" cmpd="sng" algn="ctr">
             <a:solidFill>
@@ -3368,8 +3363,8 @@
         </p:nvCxnSpPr>
         <p:spPr>
           <a:xfrm>
-            <a:off x="2593794" y="771092"/>
-            <a:ext cx="1" cy="1554863"/>
+            <a:off x="1737522" y="725049"/>
+            <a:ext cx="0" cy="618766"/>
           </a:xfrm>
           <a:prstGeom prst="straightConnector1">
             <a:avLst/>
@@ -3421,8 +3416,8 @@
         </p:nvCxnSpPr>
         <p:spPr>
           <a:xfrm flipV="1">
-            <a:off x="2219294" y="771092"/>
-            <a:ext cx="0" cy="1554863"/>
+            <a:off x="2086711" y="717989"/>
+            <a:ext cx="0" cy="618766"/>
           </a:xfrm>
           <a:prstGeom prst="straightConnector1">
             <a:avLst/>
@@ -3472,16 +3467,14 @@
         </p:nvSpPr>
         <p:spPr>
           <a:xfrm>
-            <a:off x="5955196" y="273520"/>
+            <a:off x="5000282" y="227477"/>
             <a:ext cx="1677080" cy="497572"/>
           </a:xfrm>
           <a:prstGeom prst="rect">
             <a:avLst/>
           </a:prstGeom>
           <a:solidFill>
-            <a:srgbClr val="70AD47">
-              <a:lumMod val="75000"/>
-            </a:srgbClr>
+            <a:schemeClr val="accent1"/>
           </a:solidFill>
           <a:ln w="12700" cap="flat" cmpd="sng" algn="ctr">
             <a:solidFill>
@@ -3513,112 +3506,6 @@
           </a:p>
         </p:txBody>
       </p:sp>
-      <p:cxnSp>
-        <p:nvCxnSpPr>
-          <p:cNvPr id="91" name="Straight Arrow Connector 90">
-            <a:extLst>
-              <a:ext uri="{FF2B5EF4-FFF2-40B4-BE49-F238E27FC236}">
-                <a16:creationId xmlns:a16="http://schemas.microsoft.com/office/drawing/2014/main" id="{7259F2C1-A263-6342-A9AA-3E5A7124E56E}"/>
-              </a:ext>
-            </a:extLst>
-          </p:cNvPr>
-          <p:cNvCxnSpPr>
-            <a:cxnSpLocks/>
-          </p:cNvCxnSpPr>
-          <p:nvPr/>
-        </p:nvCxnSpPr>
-        <p:spPr>
-          <a:xfrm>
-            <a:off x="7527607" y="784175"/>
-            <a:ext cx="1" cy="1554863"/>
-          </a:xfrm>
-          <a:prstGeom prst="straightConnector1">
-            <a:avLst/>
-          </a:prstGeom>
-          <a:noFill/>
-          <a:ln w="25400" cap="flat">
-            <a:solidFill>
-              <a:schemeClr val="accent1"/>
-            </a:solidFill>
-            <a:prstDash val="solid"/>
-            <a:round/>
-            <a:tailEnd type="triangle"/>
-          </a:ln>
-          <a:effectLst>
-            <a:outerShdw blurRad="38100" dist="20000" dir="5400000" rotWithShape="0">
-              <a:srgbClr val="000000">
-                <a:alpha val="38000"/>
-              </a:srgbClr>
-            </a:outerShdw>
-          </a:effectLst>
-          <a:sp3d/>
-        </p:spPr>
-        <p:style>
-          <a:lnRef idx="0">
-            <a:scrgbClr r="0" g="0" b="0"/>
-          </a:lnRef>
-          <a:fillRef idx="0">
-            <a:scrgbClr r="0" g="0" b="0"/>
-          </a:fillRef>
-          <a:effectRef idx="0">
-            <a:scrgbClr r="0" g="0" b="0"/>
-          </a:effectRef>
-          <a:fontRef idx="none"/>
-        </p:style>
-      </p:cxnSp>
-      <p:cxnSp>
-        <p:nvCxnSpPr>
-          <p:cNvPr id="92" name="Straight Arrow Connector 91">
-            <a:extLst>
-              <a:ext uri="{FF2B5EF4-FFF2-40B4-BE49-F238E27FC236}">
-                <a16:creationId xmlns:a16="http://schemas.microsoft.com/office/drawing/2014/main" id="{7AB2D0E5-AA20-AC44-8869-64E44E9870A4}"/>
-              </a:ext>
-            </a:extLst>
-          </p:cNvPr>
-          <p:cNvCxnSpPr>
-            <a:cxnSpLocks/>
-          </p:cNvCxnSpPr>
-          <p:nvPr/>
-        </p:nvCxnSpPr>
-        <p:spPr>
-          <a:xfrm flipV="1">
-            <a:off x="7305497" y="774230"/>
-            <a:ext cx="0" cy="1554863"/>
-          </a:xfrm>
-          <a:prstGeom prst="straightConnector1">
-            <a:avLst/>
-          </a:prstGeom>
-          <a:noFill/>
-          <a:ln w="25400" cap="flat">
-            <a:solidFill>
-              <a:schemeClr val="accent1"/>
-            </a:solidFill>
-            <a:prstDash val="solid"/>
-            <a:round/>
-            <a:tailEnd type="triangle"/>
-          </a:ln>
-          <a:effectLst>
-            <a:outerShdw blurRad="38100" dist="20000" dir="5400000" rotWithShape="0">
-              <a:srgbClr val="000000">
-                <a:alpha val="38000"/>
-              </a:srgbClr>
-            </a:outerShdw>
-          </a:effectLst>
-          <a:sp3d/>
-        </p:spPr>
-        <p:style>
-          <a:lnRef idx="0">
-            <a:scrgbClr r="0" g="0" b="0"/>
-          </a:lnRef>
-          <a:fillRef idx="0">
-            <a:scrgbClr r="0" g="0" b="0"/>
-          </a:fillRef>
-          <a:effectRef idx="0">
-            <a:scrgbClr r="0" g="0" b="0"/>
-          </a:effectRef>
-          <a:fontRef idx="none"/>
-        </p:style>
-      </p:cxnSp>
       <p:cxnSp>
         <p:nvCxnSpPr>
           <p:cNvPr id="93" name="Straight Arrow Connector 92">
@@ -3635,8 +3522,8 @@
         </p:nvCxnSpPr>
         <p:spPr>
           <a:xfrm>
-            <a:off x="6357322" y="779987"/>
-            <a:ext cx="1" cy="1554863"/>
+            <a:off x="5188488" y="725053"/>
+            <a:ext cx="0" cy="627661"/>
           </a:xfrm>
           <a:prstGeom prst="straightConnector1">
             <a:avLst/>
@@ -3688,8 +3575,8 @@
         </p:nvCxnSpPr>
         <p:spPr>
           <a:xfrm flipV="1">
-            <a:off x="6135211" y="764285"/>
-            <a:ext cx="0" cy="1554863"/>
+            <a:off x="5394881" y="717990"/>
+            <a:ext cx="0" cy="631414"/>
           </a:xfrm>
           <a:prstGeom prst="straightConnector1">
             <a:avLst/>
@@ -3739,8 +3626,8 @@
         </p:nvSpPr>
         <p:spPr>
           <a:xfrm>
-            <a:off x="7623662" y="1285005"/>
-            <a:ext cx="921353" cy="267637"/>
+            <a:off x="5375221" y="893557"/>
+            <a:ext cx="769786" cy="267637"/>
           </a:xfrm>
           <a:prstGeom prst="rect">
             <a:avLst/>
@@ -3773,7 +3660,7 @@
         </p:nvSpPr>
         <p:spPr>
           <a:xfrm>
-            <a:off x="5387743" y="1289449"/>
+            <a:off x="6561973" y="909079"/>
             <a:ext cx="711930" cy="267637"/>
           </a:xfrm>
           <a:prstGeom prst="rect">
@@ -3807,7 +3694,7 @@
         </p:nvSpPr>
         <p:spPr>
           <a:xfrm>
-            <a:off x="1414498" y="1262132"/>
+            <a:off x="2125015" y="805901"/>
             <a:ext cx="921353" cy="442942"/>
           </a:xfrm>
           <a:prstGeom prst="rect">
@@ -3861,8 +3748,8 @@
         </p:blipFill>
         <p:spPr>
           <a:xfrm>
-            <a:off x="7269680" y="2340878"/>
-            <a:ext cx="853927" cy="439773"/>
+            <a:off x="4362862" y="1628274"/>
+            <a:ext cx="1218756" cy="627660"/>
           </a:xfrm>
           <a:prstGeom prst="rect">
             <a:avLst/>
@@ -3886,7 +3773,7 @@
         </p:nvSpPr>
         <p:spPr>
           <a:xfrm>
-            <a:off x="673241" y="3798874"/>
+            <a:off x="196250" y="2395035"/>
             <a:ext cx="1236897" cy="218858"/>
           </a:xfrm>
           <a:prstGeom prst="rect">
@@ -3912,37 +3799,15 @@
           <a:bodyPr rtlCol="0" anchor="ctr"/>
           <a:lstStyle/>
           <a:p>
-            <a:pPr marL="0" marR="0" lvl="0" indent="0" algn="ctr" defTabSz="914400" eaLnBrk="1" fontAlgn="auto" latinLnBrk="0" hangingPunct="1">
-              <a:lnSpc>
-                <a:spcPct val="100000"/>
-              </a:lnSpc>
-              <a:spcBef>
-                <a:spcPts val="0"/>
-              </a:spcBef>
-              <a:spcAft>
-                <a:spcPts val="0"/>
-              </a:spcAft>
-              <a:buClrTx/>
-              <a:buSzTx/>
-              <a:buFontTx/>
-              <a:buNone/>
-              <a:tabLst/>
+            <a:pPr algn="ctr" defTabSz="914400">
               <a:defRPr/>
             </a:pPr>
             <a:r>
-              <a:rPr kumimoji="0" lang="en-US" sz="1200" b="0" i="0" u="none" strike="noStrike" kern="0" cap="none" spc="0" normalizeH="0" baseline="0" noProof="0" dirty="0">
-                <a:ln>
-                  <a:noFill/>
-                </a:ln>
+              <a:rPr lang="en-US" sz="1200" kern="0" dirty="0">
                 <a:solidFill>
                   <a:prstClr val="white"/>
                 </a:solidFill>
-                <a:effectLst/>
-                <a:uLnTx/>
-                <a:uFillTx/>
                 <a:latin typeface="Calibri" panose="020F0502020204030204"/>
-                <a:ea typeface="+mn-ea"/>
-                <a:cs typeface="+mn-cs"/>
               </a:rPr>
               <a:t>TileDB</a:t>
             </a:r>
@@ -3983,7 +3848,7 @@
         </p:blipFill>
         <p:spPr>
           <a:xfrm>
-            <a:off x="1656345" y="3043543"/>
+            <a:off x="1179352" y="1639704"/>
             <a:ext cx="573962" cy="480076"/>
           </a:xfrm>
           <a:prstGeom prst="rect">
@@ -4005,7 +3870,7 @@
         </p:nvSpPr>
         <p:spPr>
           <a:xfrm>
-            <a:off x="3210255" y="3575660"/>
+            <a:off x="2733266" y="2171825"/>
             <a:ext cx="1177459" cy="442073"/>
           </a:xfrm>
           <a:prstGeom prst="rect">
@@ -4031,150 +3896,31 @@
           <a:bodyPr lIns="0" rIns="0" rtlCol="0" anchor="ctr"/>
           <a:lstStyle/>
           <a:p>
-            <a:pPr marL="0" marR="0" lvl="0" indent="0" algn="ctr" defTabSz="914400" eaLnBrk="1" fontAlgn="auto" latinLnBrk="0" hangingPunct="1">
-              <a:lnSpc>
-                <a:spcPct val="100000"/>
-              </a:lnSpc>
-              <a:spcBef>
-                <a:spcPts val="0"/>
-              </a:spcBef>
-              <a:spcAft>
-                <a:spcPts val="0"/>
-              </a:spcAft>
-              <a:buClrTx/>
-              <a:buSzTx/>
-              <a:buFontTx/>
-              <a:buNone/>
-              <a:tabLst/>
+            <a:pPr algn="ctr" defTabSz="914400">
               <a:defRPr/>
             </a:pPr>
             <a:r>
-              <a:rPr kumimoji="0" lang="en-US" sz="1100" b="0" i="0" u="none" strike="noStrike" kern="0" cap="none" spc="0" normalizeH="0" baseline="0" noProof="0" dirty="0">
-                <a:ln>
-                  <a:noFill/>
-                </a:ln>
+              <a:rPr lang="en-US" sz="1100" kern="0" dirty="0">
                 <a:solidFill>
                   <a:prstClr val="white"/>
                 </a:solidFill>
-                <a:effectLst/>
-                <a:uLnTx/>
-                <a:uFillTx/>
                 <a:latin typeface="Calibri" panose="020F0502020204030204"/>
-                <a:ea typeface="+mn-ea"/>
-                <a:cs typeface="+mn-cs"/>
               </a:rPr>
               <a:t>Persistent Memory</a:t>
             </a:r>
           </a:p>
           <a:p>
-            <a:pPr marL="0" marR="0" lvl="0" indent="0" algn="ctr" defTabSz="914400" eaLnBrk="1" fontAlgn="auto" latinLnBrk="0" hangingPunct="1">
-              <a:lnSpc>
-                <a:spcPct val="100000"/>
-              </a:lnSpc>
-              <a:spcBef>
-                <a:spcPts val="0"/>
-              </a:spcBef>
-              <a:spcAft>
-                <a:spcPts val="0"/>
-              </a:spcAft>
-              <a:buClrTx/>
-              <a:buSzTx/>
-              <a:buFontTx/>
-              <a:buNone/>
-              <a:tabLst/>
+            <a:pPr algn="ctr" defTabSz="914400">
               <a:defRPr/>
             </a:pPr>
             <a:r>
-              <a:rPr kumimoji="0" lang="en-US" sz="1100" b="0" i="0" u="none" strike="noStrike" kern="0" cap="none" spc="0" normalizeH="0" baseline="0" noProof="0" dirty="0">
-                <a:ln>
-                  <a:noFill/>
-                </a:ln>
+              <a:rPr lang="en-US" sz="1100" kern="0" dirty="0">
                 <a:solidFill>
                   <a:prstClr val="white"/>
                 </a:solidFill>
-                <a:effectLst/>
-                <a:uLnTx/>
-                <a:uFillTx/>
                 <a:latin typeface="Calibri" panose="020F0502020204030204"/>
-                <a:ea typeface="+mn-ea"/>
-                <a:cs typeface="+mn-cs"/>
               </a:rPr>
               <a:t>Graph DB</a:t>
-            </a:r>
-          </a:p>
-        </p:txBody>
-      </p:sp>
-      <p:sp>
-        <p:nvSpPr>
-          <p:cNvPr id="35" name="Rectangle 34">
-            <a:extLst>
-              <a:ext uri="{FF2B5EF4-FFF2-40B4-BE49-F238E27FC236}">
-                <a16:creationId xmlns:a16="http://schemas.microsoft.com/office/drawing/2014/main" id="{329679C3-D85E-CF46-8B24-429D2BCE64F3}"/>
-              </a:ext>
-            </a:extLst>
-          </p:cNvPr>
-          <p:cNvSpPr/>
-          <p:nvPr/>
-        </p:nvSpPr>
-        <p:spPr>
-          <a:xfrm>
-            <a:off x="665094" y="2334850"/>
-            <a:ext cx="3708003" cy="375987"/>
-          </a:xfrm>
-          <a:prstGeom prst="rect">
-            <a:avLst/>
-          </a:prstGeom>
-          <a:solidFill>
-            <a:srgbClr val="5B9BD5"/>
-          </a:solidFill>
-          <a:ln w="12700" cap="flat" cmpd="sng" algn="ctr">
-            <a:solidFill>
-              <a:srgbClr val="5B9BD5">
-                <a:shade val="50000"/>
-              </a:srgbClr>
-            </a:solidFill>
-            <a:prstDash val="solid"/>
-            <a:miter lim="800000"/>
-          </a:ln>
-          <a:effectLst/>
-        </p:spPr>
-        <p:txBody>
-          <a:bodyPr rtlCol="0" anchor="ctr"/>
-          <a:lstStyle/>
-          <a:p>
-            <a:pPr marL="0" marR="0" lvl="0" indent="0" algn="ctr" defTabSz="914400" eaLnBrk="1" fontAlgn="auto" latinLnBrk="0" hangingPunct="1">
-              <a:lnSpc>
-                <a:spcPct val="100000"/>
-              </a:lnSpc>
-              <a:spcBef>
-                <a:spcPts val="0"/>
-              </a:spcBef>
-              <a:spcAft>
-                <a:spcPts val="0"/>
-              </a:spcAft>
-              <a:buClrTx/>
-              <a:buSzTx/>
-              <a:buFontTx/>
-              <a:buNone/>
-              <a:tabLst/>
-              <a:defRPr/>
-            </a:pPr>
-            <a:r>
-              <a:rPr kumimoji="0" lang="en-US" sz="1400" b="0" i="0" u="none" strike="noStrike" kern="0" cap="none" spc="0" normalizeH="0" baseline="0" noProof="0" dirty="0">
-                <a:ln>
-                  <a:noFill/>
-                </a:ln>
-                <a:solidFill>
-                  <a:prstClr val="white"/>
-                </a:solidFill>
-                <a:effectLst/>
-                <a:uLnTx/>
-                <a:uFillTx/>
-                <a:latin typeface="Calibri" panose="020F0502020204030204"/>
-                <a:ea typeface="+mn-ea"/>
-                <a:cs typeface="+mn-cs"/>
-              </a:rPr>
-              <a:t>Machine Learning Pipelines / End Users</a:t>
             </a:r>
           </a:p>
         </p:txBody>
@@ -4193,7 +3939,7 @@
         </p:nvSpPr>
         <p:spPr>
           <a:xfrm>
-            <a:off x="1941748" y="3798874"/>
+            <a:off x="1464759" y="2395035"/>
             <a:ext cx="1236897" cy="218858"/>
           </a:xfrm>
           <a:prstGeom prst="rect">
@@ -4219,37 +3965,15 @@
           <a:bodyPr rtlCol="0" anchor="ctr"/>
           <a:lstStyle/>
           <a:p>
-            <a:pPr marL="0" marR="0" lvl="0" indent="0" algn="ctr" defTabSz="914400" eaLnBrk="1" fontAlgn="auto" latinLnBrk="0" hangingPunct="1">
-              <a:lnSpc>
-                <a:spcPct val="100000"/>
-              </a:lnSpc>
-              <a:spcBef>
-                <a:spcPts val="0"/>
-              </a:spcBef>
-              <a:spcAft>
-                <a:spcPts val="0"/>
-              </a:spcAft>
-              <a:buClrTx/>
-              <a:buSzTx/>
-              <a:buFontTx/>
-              <a:buNone/>
-              <a:tabLst/>
+            <a:pPr algn="ctr" defTabSz="914400">
               <a:defRPr/>
             </a:pPr>
             <a:r>
-              <a:rPr kumimoji="0" lang="en-US" sz="1200" b="0" i="0" u="none" strike="noStrike" kern="0" cap="none" spc="0" normalizeH="0" baseline="0" noProof="0" dirty="0">
-                <a:ln>
-                  <a:noFill/>
-                </a:ln>
+              <a:rPr lang="en-US" sz="1200" kern="0" dirty="0">
                 <a:solidFill>
                   <a:prstClr val="white"/>
                 </a:solidFill>
-                <a:effectLst/>
-                <a:uLnTx/>
-                <a:uFillTx/>
                 <a:latin typeface="Calibri" panose="020F0502020204030204"/>
-                <a:ea typeface="+mn-ea"/>
-                <a:cs typeface="+mn-cs"/>
               </a:rPr>
               <a:t>OpenCV</a:t>
             </a:r>
@@ -4291,7 +4015,7 @@
         </p:blipFill>
         <p:spPr>
           <a:xfrm>
-            <a:off x="2483109" y="3043543"/>
+            <a:off x="2006116" y="1639704"/>
             <a:ext cx="570396" cy="480076"/>
           </a:xfrm>
           <a:prstGeom prst="rect">
@@ -4334,7 +4058,7 @@
         </p:blipFill>
         <p:spPr>
           <a:xfrm>
-            <a:off x="3538431" y="3032113"/>
+            <a:off x="3061438" y="1628274"/>
             <a:ext cx="434256" cy="480076"/>
           </a:xfrm>
           <a:prstGeom prst="rect">
@@ -4376,7 +4100,7 @@
         </p:blipFill>
         <p:spPr>
           <a:xfrm>
-            <a:off x="912528" y="3043543"/>
+            <a:off x="435539" y="1639704"/>
             <a:ext cx="491015" cy="480076"/>
           </a:xfrm>
           <a:prstGeom prst="rect">
@@ -4398,7 +4122,7 @@
         </p:nvSpPr>
         <p:spPr>
           <a:xfrm>
-            <a:off x="665094" y="2735090"/>
+            <a:off x="188103" y="1331253"/>
             <a:ext cx="3708003" cy="250687"/>
           </a:xfrm>
           <a:prstGeom prst="rect">
@@ -4424,37 +4148,15 @@
           <a:bodyPr rtlCol="0" anchor="ctr"/>
           <a:lstStyle/>
           <a:p>
-            <a:pPr marL="0" marR="0" lvl="0" indent="0" algn="ctr" defTabSz="914400" eaLnBrk="1" fontAlgn="auto" latinLnBrk="0" hangingPunct="1">
-              <a:lnSpc>
-                <a:spcPct val="100000"/>
-              </a:lnSpc>
-              <a:spcBef>
-                <a:spcPts val="0"/>
-              </a:spcBef>
-              <a:spcAft>
-                <a:spcPts val="0"/>
-              </a:spcAft>
-              <a:buClrTx/>
-              <a:buSzTx/>
-              <a:buFontTx/>
-              <a:buNone/>
-              <a:tabLst/>
+            <a:pPr algn="ctr" defTabSz="914400">
               <a:defRPr/>
             </a:pPr>
             <a:r>
-              <a:rPr kumimoji="0" lang="en-US" sz="1400" b="0" i="0" u="none" strike="noStrike" kern="0" cap="none" spc="0" normalizeH="0" baseline="0" noProof="0" dirty="0">
-                <a:ln>
-                  <a:noFill/>
-                </a:ln>
+              <a:rPr lang="en-US" sz="1400" kern="0" dirty="0">
                 <a:solidFill>
                   <a:prstClr val="white"/>
                 </a:solidFill>
-                <a:effectLst/>
-                <a:uLnTx/>
-                <a:uFillTx/>
                 <a:latin typeface="Calibri" panose="020F0502020204030204"/>
-                <a:ea typeface="+mn-ea"/>
-                <a:cs typeface="+mn-cs"/>
               </a:rPr>
               <a:t>Request Server</a:t>
             </a:r>
@@ -4475,7 +4177,7 @@
         </p:nvSpPr>
         <p:spPr>
           <a:xfrm>
-            <a:off x="673241" y="3575660"/>
+            <a:off x="196250" y="2171821"/>
             <a:ext cx="2505405" cy="198962"/>
           </a:xfrm>
           <a:prstGeom prst="rect">
@@ -4501,37 +4203,15 @@
           <a:bodyPr rtlCol="0" anchor="ctr"/>
           <a:lstStyle/>
           <a:p>
-            <a:pPr marL="0" marR="0" lvl="0" indent="0" algn="ctr" defTabSz="914400" eaLnBrk="1" fontAlgn="auto" latinLnBrk="0" hangingPunct="1">
-              <a:lnSpc>
-                <a:spcPct val="100000"/>
-              </a:lnSpc>
-              <a:spcBef>
-                <a:spcPts val="0"/>
-              </a:spcBef>
-              <a:spcAft>
-                <a:spcPts val="0"/>
-              </a:spcAft>
-              <a:buClrTx/>
-              <a:buSzTx/>
-              <a:buFontTx/>
-              <a:buNone/>
-              <a:tabLst/>
+            <a:pPr algn="ctr" defTabSz="914400">
               <a:defRPr/>
             </a:pPr>
             <a:r>
-              <a:rPr kumimoji="0" lang="en-US" sz="1200" b="0" i="0" u="none" strike="noStrike" kern="0" cap="none" spc="0" normalizeH="0" baseline="0" noProof="0" dirty="0">
-                <a:ln>
-                  <a:noFill/>
-                </a:ln>
+              <a:rPr lang="en-US" sz="1200" kern="0" dirty="0">
                 <a:solidFill>
                   <a:prstClr val="white"/>
                 </a:solidFill>
-                <a:effectLst/>
-                <a:uLnTx/>
-                <a:uFillTx/>
                 <a:latin typeface="Calibri" panose="020F0502020204030204"/>
-                <a:ea typeface="+mn-ea"/>
-                <a:cs typeface="+mn-cs"/>
               </a:rPr>
               <a:t>Visual Compute Module</a:t>
             </a:r>
@@ -4560,7 +4240,7 @@
         </p:blipFill>
         <p:spPr>
           <a:xfrm>
-            <a:off x="912528" y="4069774"/>
+            <a:off x="435535" y="2665935"/>
             <a:ext cx="810498" cy="810498"/>
           </a:xfrm>
           <a:prstGeom prst="rect">
@@ -4593,7 +4273,7 @@
         </p:blipFill>
         <p:spPr>
           <a:xfrm>
-            <a:off x="1738051" y="4069774"/>
+            <a:off x="1261058" y="2665935"/>
             <a:ext cx="810498" cy="810498"/>
           </a:xfrm>
           <a:prstGeom prst="rect">
@@ -4626,7 +4306,7 @@
         </p:blipFill>
         <p:spPr>
           <a:xfrm>
-            <a:off x="2560196" y="4069774"/>
+            <a:off x="2083203" y="2665935"/>
             <a:ext cx="810498" cy="810498"/>
           </a:xfrm>
           <a:prstGeom prst="rect">
@@ -4659,7 +4339,7 @@
         </p:blipFill>
         <p:spPr>
           <a:xfrm>
-            <a:off x="3382341" y="4069774"/>
+            <a:off x="2905348" y="2665935"/>
             <a:ext cx="810498" cy="810498"/>
           </a:xfrm>
           <a:prstGeom prst="rect">
@@ -4692,7 +4372,7 @@
         </p:blipFill>
         <p:spPr>
           <a:xfrm>
-            <a:off x="5140394" y="2852951"/>
+            <a:off x="4174759" y="2665935"/>
             <a:ext cx="810498" cy="810498"/>
           </a:xfrm>
           <a:prstGeom prst="rect">
@@ -4725,7 +4405,7 @@
         </p:blipFill>
         <p:spPr>
           <a:xfrm>
-            <a:off x="5965917" y="2852951"/>
+            <a:off x="5000282" y="2665935"/>
             <a:ext cx="810498" cy="810498"/>
           </a:xfrm>
           <a:prstGeom prst="rect">
@@ -4758,7 +4438,7 @@
         </p:blipFill>
         <p:spPr>
           <a:xfrm>
-            <a:off x="6788062" y="2852951"/>
+            <a:off x="5822427" y="2665935"/>
             <a:ext cx="810498" cy="810498"/>
           </a:xfrm>
           <a:prstGeom prst="rect">
@@ -4791,7 +4471,7 @@
         </p:blipFill>
         <p:spPr>
           <a:xfrm>
-            <a:off x="7610207" y="2852951"/>
+            <a:off x="6644572" y="2665935"/>
             <a:ext cx="810498" cy="810498"/>
           </a:xfrm>
           <a:prstGeom prst="rect">
@@ -4802,6 +4482,112 @@
           </a:ln>
         </p:spPr>
       </p:pic>
+      <p:cxnSp>
+        <p:nvCxnSpPr>
+          <p:cNvPr id="52" name="Straight Arrow Connector 51">
+            <a:extLst>
+              <a:ext uri="{FF2B5EF4-FFF2-40B4-BE49-F238E27FC236}">
+                <a16:creationId xmlns:a16="http://schemas.microsoft.com/office/drawing/2014/main" id="{85D06064-5B9A-714C-A343-BBB4A84B36B5}"/>
+              </a:ext>
+            </a:extLst>
+          </p:cNvPr>
+          <p:cNvCxnSpPr>
+            <a:cxnSpLocks/>
+          </p:cNvCxnSpPr>
+          <p:nvPr/>
+        </p:nvCxnSpPr>
+        <p:spPr>
+          <a:xfrm>
+            <a:off x="6309263" y="728228"/>
+            <a:ext cx="0" cy="627661"/>
+          </a:xfrm>
+          <a:prstGeom prst="straightConnector1">
+            <a:avLst/>
+          </a:prstGeom>
+          <a:noFill/>
+          <a:ln w="25400" cap="flat">
+            <a:solidFill>
+              <a:schemeClr val="accent1"/>
+            </a:solidFill>
+            <a:prstDash val="solid"/>
+            <a:round/>
+            <a:tailEnd type="triangle"/>
+          </a:ln>
+          <a:effectLst>
+            <a:outerShdw blurRad="38100" dist="20000" dir="5400000" rotWithShape="0">
+              <a:srgbClr val="000000">
+                <a:alpha val="38000"/>
+              </a:srgbClr>
+            </a:outerShdw>
+          </a:effectLst>
+          <a:sp3d/>
+        </p:spPr>
+        <p:style>
+          <a:lnRef idx="0">
+            <a:scrgbClr r="0" g="0" b="0"/>
+          </a:lnRef>
+          <a:fillRef idx="0">
+            <a:scrgbClr r="0" g="0" b="0"/>
+          </a:fillRef>
+          <a:effectRef idx="0">
+            <a:scrgbClr r="0" g="0" b="0"/>
+          </a:effectRef>
+          <a:fontRef idx="none"/>
+        </p:style>
+      </p:cxnSp>
+      <p:cxnSp>
+        <p:nvCxnSpPr>
+          <p:cNvPr id="53" name="Straight Arrow Connector 52">
+            <a:extLst>
+              <a:ext uri="{FF2B5EF4-FFF2-40B4-BE49-F238E27FC236}">
+                <a16:creationId xmlns:a16="http://schemas.microsoft.com/office/drawing/2014/main" id="{1EB3714C-07BE-6F42-8AE2-D1448C957680}"/>
+              </a:ext>
+            </a:extLst>
+          </p:cNvPr>
+          <p:cNvCxnSpPr>
+            <a:cxnSpLocks/>
+          </p:cNvCxnSpPr>
+          <p:nvPr/>
+        </p:nvCxnSpPr>
+        <p:spPr>
+          <a:xfrm flipV="1">
+            <a:off x="6515656" y="721165"/>
+            <a:ext cx="0" cy="631414"/>
+          </a:xfrm>
+          <a:prstGeom prst="straightConnector1">
+            <a:avLst/>
+          </a:prstGeom>
+          <a:noFill/>
+          <a:ln w="25400" cap="flat">
+            <a:solidFill>
+              <a:schemeClr val="accent1"/>
+            </a:solidFill>
+            <a:prstDash val="solid"/>
+            <a:round/>
+            <a:tailEnd type="triangle"/>
+          </a:ln>
+          <a:effectLst>
+            <a:outerShdw blurRad="38100" dist="20000" dir="5400000" rotWithShape="0">
+              <a:srgbClr val="000000">
+                <a:alpha val="38000"/>
+              </a:srgbClr>
+            </a:outerShdw>
+          </a:effectLst>
+          <a:sp3d/>
+        </p:spPr>
+        <p:style>
+          <a:lnRef idx="0">
+            <a:scrgbClr r="0" g="0" b="0"/>
+          </a:lnRef>
+          <a:fillRef idx="0">
+            <a:scrgbClr r="0" g="0" b="0"/>
+          </a:fillRef>
+          <a:effectRef idx="0">
+            <a:scrgbClr r="0" g="0" b="0"/>
+          </a:effectRef>
+          <a:fontRef idx="none"/>
+        </p:style>
+      </p:cxnSp>
     </p:spTree>
     <p:extLst>
       <p:ext uri="{BB962C8B-B14F-4D97-AF65-F5344CB8AC3E}">

</xml_diff>

<commit_message>
Paper submitted Feb 26
</commit_message>
<xml_diff>
--- a/yfcc100m/paper/vldb2020/figures/comparison_system.pptx
+++ b/yfcc100m/paper/vldb2020/figures/comparison_system.pptx
@@ -243,7 +243,7 @@
           <a:p>
             <a:fld id="{FC088DA2-E2B4-0147-A2CD-628931F110B8}" type="datetimeFigureOut">
               <a:rPr lang="en-US" smtClean="0"/>
-              <a:t>1/31/20</a:t>
+              <a:t>2/25/20</a:t>
             </a:fld>
             <a:endParaRPr lang="en-US"/>
           </a:p>
@@ -413,7 +413,7 @@
           <a:p>
             <a:fld id="{FC088DA2-E2B4-0147-A2CD-628931F110B8}" type="datetimeFigureOut">
               <a:rPr lang="en-US" smtClean="0"/>
-              <a:t>1/31/20</a:t>
+              <a:t>2/25/20</a:t>
             </a:fld>
             <a:endParaRPr lang="en-US"/>
           </a:p>
@@ -593,7 +593,7 @@
           <a:p>
             <a:fld id="{FC088DA2-E2B4-0147-A2CD-628931F110B8}" type="datetimeFigureOut">
               <a:rPr lang="en-US" smtClean="0"/>
-              <a:t>1/31/20</a:t>
+              <a:t>2/25/20</a:t>
             </a:fld>
             <a:endParaRPr lang="en-US"/>
           </a:p>
@@ -951,7 +951,7 @@
           <a:p>
             <a:fld id="{FC088DA2-E2B4-0147-A2CD-628931F110B8}" type="datetimeFigureOut">
               <a:rPr lang="en-US" smtClean="0"/>
-              <a:t>1/31/20</a:t>
+              <a:t>2/25/20</a:t>
             </a:fld>
             <a:endParaRPr lang="en-US"/>
           </a:p>
@@ -1197,7 +1197,7 @@
           <a:p>
             <a:fld id="{FC088DA2-E2B4-0147-A2CD-628931F110B8}" type="datetimeFigureOut">
               <a:rPr lang="en-US" smtClean="0"/>
-              <a:t>1/31/20</a:t>
+              <a:t>2/25/20</a:t>
             </a:fld>
             <a:endParaRPr lang="en-US"/>
           </a:p>
@@ -1429,7 +1429,7 @@
           <a:p>
             <a:fld id="{FC088DA2-E2B4-0147-A2CD-628931F110B8}" type="datetimeFigureOut">
               <a:rPr lang="en-US" smtClean="0"/>
-              <a:t>1/31/20</a:t>
+              <a:t>2/25/20</a:t>
             </a:fld>
             <a:endParaRPr lang="en-US"/>
           </a:p>
@@ -1796,7 +1796,7 @@
           <a:p>
             <a:fld id="{FC088DA2-E2B4-0147-A2CD-628931F110B8}" type="datetimeFigureOut">
               <a:rPr lang="en-US" smtClean="0"/>
-              <a:t>1/31/20</a:t>
+              <a:t>2/25/20</a:t>
             </a:fld>
             <a:endParaRPr lang="en-US"/>
           </a:p>
@@ -1914,7 +1914,7 @@
           <a:p>
             <a:fld id="{FC088DA2-E2B4-0147-A2CD-628931F110B8}" type="datetimeFigureOut">
               <a:rPr lang="en-US" smtClean="0"/>
-              <a:t>1/31/20</a:t>
+              <a:t>2/25/20</a:t>
             </a:fld>
             <a:endParaRPr lang="en-US"/>
           </a:p>
@@ -2009,7 +2009,7 @@
           <a:p>
             <a:fld id="{FC088DA2-E2B4-0147-A2CD-628931F110B8}" type="datetimeFigureOut">
               <a:rPr lang="en-US" smtClean="0"/>
-              <a:t>1/31/20</a:t>
+              <a:t>2/25/20</a:t>
             </a:fld>
             <a:endParaRPr lang="en-US"/>
           </a:p>
@@ -2286,7 +2286,7 @@
           <a:p>
             <a:fld id="{FC088DA2-E2B4-0147-A2CD-628931F110B8}" type="datetimeFigureOut">
               <a:rPr lang="en-US" smtClean="0"/>
-              <a:t>1/31/20</a:t>
+              <a:t>2/25/20</a:t>
             </a:fld>
             <a:endParaRPr lang="en-US"/>
           </a:p>
@@ -2543,7 +2543,7 @@
           <a:p>
             <a:fld id="{FC088DA2-E2B4-0147-A2CD-628931F110B8}" type="datetimeFigureOut">
               <a:rPr lang="en-US" smtClean="0"/>
-              <a:t>1/31/20</a:t>
+              <a:t>2/25/20</a:t>
             </a:fld>
             <a:endParaRPr lang="en-US"/>
           </a:p>
@@ -2756,7 +2756,7 @@
           <a:p>
             <a:fld id="{FC088DA2-E2B4-0147-A2CD-628931F110B8}" type="datetimeFigureOut">
               <a:rPr lang="en-US" smtClean="0"/>
-              <a:t>1/31/20</a:t>
+              <a:t>2/25/20</a:t>
             </a:fld>
             <a:endParaRPr lang="en-US"/>
           </a:p>
@@ -3294,59 +3294,6 @@
           </a:prstGeom>
         </p:spPr>
       </p:pic>
-      <p:sp>
-        <p:nvSpPr>
-          <p:cNvPr id="75" name="Rectangle 74">
-            <a:extLst>
-              <a:ext uri="{FF2B5EF4-FFF2-40B4-BE49-F238E27FC236}">
-                <a16:creationId xmlns:a16="http://schemas.microsoft.com/office/drawing/2014/main" id="{913F6F73-EBBB-CE42-9275-CC52A487838C}"/>
-              </a:ext>
-            </a:extLst>
-          </p:cNvPr>
-          <p:cNvSpPr/>
-          <p:nvPr/>
-        </p:nvSpPr>
-        <p:spPr>
-          <a:xfrm>
-            <a:off x="1119673" y="227477"/>
-            <a:ext cx="1677080" cy="497572"/>
-          </a:xfrm>
-          <a:prstGeom prst="rect">
-            <a:avLst/>
-          </a:prstGeom>
-          <a:solidFill>
-            <a:schemeClr val="accent1"/>
-          </a:solidFill>
-          <a:ln w="12700" cap="flat" cmpd="sng" algn="ctr">
-            <a:solidFill>
-              <a:srgbClr val="5B9BD5">
-                <a:shade val="50000"/>
-              </a:srgbClr>
-            </a:solidFill>
-            <a:prstDash val="solid"/>
-            <a:miter lim="800000"/>
-          </a:ln>
-          <a:effectLst/>
-        </p:spPr>
-        <p:txBody>
-          <a:bodyPr rtlCol="0" anchor="ctr"/>
-          <a:lstStyle/>
-          <a:p>
-            <a:pPr algn="ctr" defTabSz="1157114">
-              <a:defRPr/>
-            </a:pPr>
-            <a:r>
-              <a:rPr lang="en-US" sz="1519" kern="0" dirty="0">
-                <a:solidFill>
-                  <a:prstClr val="white"/>
-                </a:solidFill>
-                <a:latin typeface="Calibri" panose="020F0502020204030204"/>
-              </a:rPr>
-              <a:t>Client Application</a:t>
-            </a:r>
-          </a:p>
-        </p:txBody>
-      </p:sp>
       <p:cxnSp>
         <p:nvCxnSpPr>
           <p:cNvPr id="77" name="Straight Arrow Connector 76">
@@ -3467,8 +3414,8 @@
         </p:nvSpPr>
         <p:spPr>
           <a:xfrm>
-            <a:off x="5000282" y="227477"/>
-            <a:ext cx="1677080" cy="497572"/>
+            <a:off x="4864464" y="90397"/>
+            <a:ext cx="1838381" cy="627661"/>
           </a:xfrm>
           <a:prstGeom prst="rect">
             <a:avLst/>
@@ -4588,6 +4535,114 @@
           <a:fontRef idx="none"/>
         </p:style>
       </p:cxnSp>
+      <p:sp>
+        <p:nvSpPr>
+          <p:cNvPr id="35" name="Rectangle 34">
+            <a:extLst>
+              <a:ext uri="{FF2B5EF4-FFF2-40B4-BE49-F238E27FC236}">
+                <a16:creationId xmlns:a16="http://schemas.microsoft.com/office/drawing/2014/main" id="{0FC7D450-B1E9-8D43-BE55-C571EC10C874}"/>
+              </a:ext>
+            </a:extLst>
+          </p:cNvPr>
+          <p:cNvSpPr/>
+          <p:nvPr/>
+        </p:nvSpPr>
+        <p:spPr>
+          <a:xfrm>
+            <a:off x="5925298" y="532955"/>
+            <a:ext cx="754629" cy="184197"/>
+          </a:xfrm>
+          <a:prstGeom prst="rect">
+            <a:avLst/>
+          </a:prstGeom>
+          <a:solidFill>
+            <a:srgbClr val="70AD47">
+              <a:lumMod val="75000"/>
+            </a:srgbClr>
+          </a:solidFill>
+          <a:ln w="12700" cap="flat" cmpd="sng" algn="ctr">
+            <a:solidFill>
+              <a:srgbClr val="5B9BD5">
+                <a:shade val="50000"/>
+              </a:srgbClr>
+            </a:solidFill>
+            <a:prstDash val="solid"/>
+            <a:miter lim="800000"/>
+          </a:ln>
+          <a:effectLst/>
+        </p:spPr>
+        <p:txBody>
+          <a:bodyPr rtlCol="0" anchor="ctr"/>
+          <a:lstStyle/>
+          <a:p>
+            <a:pPr algn="ctr" defTabSz="914400">
+              <a:defRPr/>
+            </a:pPr>
+            <a:r>
+              <a:rPr lang="en-US" sz="1100" kern="0" dirty="0">
+                <a:solidFill>
+                  <a:prstClr val="white"/>
+                </a:solidFill>
+                <a:latin typeface="Calibri" panose="020F0502020204030204"/>
+              </a:rPr>
+              <a:t>OpenCV</a:t>
+            </a:r>
+          </a:p>
+        </p:txBody>
+      </p:sp>
+      <p:sp>
+        <p:nvSpPr>
+          <p:cNvPr id="36" name="Rectangle 35">
+            <a:extLst>
+              <a:ext uri="{FF2B5EF4-FFF2-40B4-BE49-F238E27FC236}">
+                <a16:creationId xmlns:a16="http://schemas.microsoft.com/office/drawing/2014/main" id="{EBE1E7B4-4DD9-0C44-97AC-BB717A89DF2D}"/>
+              </a:ext>
+            </a:extLst>
+          </p:cNvPr>
+          <p:cNvSpPr/>
+          <p:nvPr/>
+        </p:nvSpPr>
+        <p:spPr>
+          <a:xfrm>
+            <a:off x="1003760" y="90328"/>
+            <a:ext cx="1838381" cy="627661"/>
+          </a:xfrm>
+          <a:prstGeom prst="rect">
+            <a:avLst/>
+          </a:prstGeom>
+          <a:solidFill>
+            <a:schemeClr val="accent1"/>
+          </a:solidFill>
+          <a:ln w="12700" cap="flat" cmpd="sng" algn="ctr">
+            <a:solidFill>
+              <a:srgbClr val="5B9BD5">
+                <a:shade val="50000"/>
+              </a:srgbClr>
+            </a:solidFill>
+            <a:prstDash val="solid"/>
+            <a:miter lim="800000"/>
+          </a:ln>
+          <a:effectLst/>
+        </p:spPr>
+        <p:txBody>
+          <a:bodyPr rtlCol="0" anchor="ctr"/>
+          <a:lstStyle/>
+          <a:p>
+            <a:pPr algn="ctr" defTabSz="1157114">
+              <a:defRPr/>
+            </a:pPr>
+            <a:r>
+              <a:rPr lang="en-US" sz="1519" kern="0" dirty="0">
+                <a:solidFill>
+                  <a:prstClr val="white"/>
+                </a:solidFill>
+                <a:latin typeface="Calibri" panose="020F0502020204030204"/>
+              </a:rPr>
+              <a:t>Client Application</a:t>
+            </a:r>
+          </a:p>
+        </p:txBody>
+      </p:sp>
     </p:spTree>
     <p:extLst>
       <p:ext uri="{BB962C8B-B14F-4D97-AF65-F5344CB8AC3E}">

</xml_diff>